<commit_message>
some edit to references idea
</commit_message>
<xml_diff>
--- a/project/demoCode/posterPaper/poster.pptx
+++ b/project/demoCode/posterPaper/poster.pptx
@@ -109,7 +109,7 @@
   </p:defaultTextStyle>
   <p:extLst>
     <p:ext uri="{EFAFB233-063F-42B5-8137-9DF3F51BA10A}">
-      <p15:sldGuideLst xmlns:p15="http://schemas.microsoft.com/office/powerpoint/2012/main" xmlns="">
+      <p15:sldGuideLst xmlns="" xmlns:p15="http://schemas.microsoft.com/office/powerpoint/2012/main">
         <p15:guide id="1" orient="horz" pos="3318">
           <p15:clr>
             <a:srgbClr val="A4A3A4"/>
@@ -163,7 +163,7 @@
       </p15:sldGuideLst>
     </p:ext>
     <p:ext uri="{2D200454-40CA-4A62-9FC3-DE9A4176ACB9}">
-      <p15:notesGuideLst xmlns:p15="http://schemas.microsoft.com/office/powerpoint/2012/main" xmlns="">
+      <p15:notesGuideLst xmlns="" xmlns:p15="http://schemas.microsoft.com/office/powerpoint/2012/main">
         <p15:guide id="1" orient="horz" pos="13681">
           <p15:clr>
             <a:srgbClr val="A4A3A4"/>
@@ -5586,7 +5586,7 @@
             <a:fld id="{E6CC2317-6751-4CD4-9995-8782DD78E936}" type="datetimeFigureOut">
               <a:rPr lang="en-US" smtClean="0"/>
               <a:pPr/>
-              <a:t>12/1/15</a:t>
+              <a:t>12/2/15</a:t>
             </a:fld>
             <a:endParaRPr lang="en-US" dirty="0"/>
           </a:p>
@@ -8552,7 +8552,7 @@
               <a:graphicData uri="http://schemas.openxmlformats.org/presentationml/2006/ole">
                 <mc:AlternateContent xmlns:mc="http://schemas.openxmlformats.org/markup-compatibility/2006">
                   <mc:Choice xmlns:v="urn:schemas-microsoft-com:vml" Requires="v">
-                    <p:oleObj spid="_x0000_s1173" name="Image" r:id="rId8" imgW="1828440" imgH="1117440" progId="Photoshop.Image.13">
+                    <p:oleObj spid="_x0000_s1178" name="Image" r:id="rId8" imgW="1828440" imgH="1117440" progId="Photoshop.Image.13">
                       <p:embed/>
                     </p:oleObj>
                   </mc:Choice>
@@ -8609,7 +8609,7 @@
               <a:graphicData uri="http://schemas.openxmlformats.org/presentationml/2006/ole">
                 <mc:AlternateContent xmlns:mc="http://schemas.openxmlformats.org/markup-compatibility/2006">
                   <mc:Choice xmlns:v="urn:schemas-microsoft-com:vml" Requires="v">
-                    <p:oleObj spid="_x0000_s1174" name="Image" r:id="rId10" imgW="1828440" imgH="1117440" progId="Photoshop.Image.13">
+                    <p:oleObj spid="_x0000_s1179" name="Image" r:id="rId10" imgW="1828440" imgH="1117440" progId="Photoshop.Image.13">
                       <p:embed/>
                     </p:oleObj>
                   </mc:Choice>
@@ -9737,7 +9737,7 @@
             <a:graphicData uri="http://schemas.openxmlformats.org/presentationml/2006/ole">
               <mc:AlternateContent xmlns:mc="http://schemas.openxmlformats.org/markup-compatibility/2006">
                 <mc:Choice xmlns:v="urn:schemas-microsoft-com:vml" Requires="v">
-                  <p:oleObj spid="_x0000_s1175" name="Image" r:id="rId12" imgW="4571280" imgH="1688760" progId="Photoshop.Image.13">
+                  <p:oleObj spid="_x0000_s1180" name="Image" r:id="rId12" imgW="4571280" imgH="1688760" progId="Photoshop.Image.13">
                     <p:embed/>
                   </p:oleObj>
                 </mc:Choice>
@@ -9821,7 +9821,7 @@
             <a:graphicData uri="http://schemas.openxmlformats.org/presentationml/2006/ole">
               <mc:AlternateContent xmlns:mc="http://schemas.openxmlformats.org/markup-compatibility/2006">
                 <mc:Choice xmlns:v="urn:schemas-microsoft-com:vml" Requires="v">
-                  <p:oleObj spid="_x0000_s1176" name="Image" r:id="rId15" imgW="1574280" imgH="1053720" progId="Photoshop.Image.13">
+                  <p:oleObj spid="_x0000_s1181" name="Image" r:id="rId15" imgW="1574280" imgH="1053720" progId="Photoshop.Image.13">
                     <p:embed/>
                   </p:oleObj>
                 </mc:Choice>
@@ -10774,7 +10774,6 @@
               <a:rPr lang="en-US" dirty="0" smtClean="0"/>
               <a:t>)</a:t>
             </a:r>
-            <a:endParaRPr lang="en-US" dirty="0" smtClean="0"/>
           </a:p>
           <a:p>
             <a:r>
@@ -12014,11 +12013,7 @@
           <a:p>
             <a:r>
               <a:rPr lang="en-US" sz="1800" b="1" dirty="0" smtClean="0"/>
-              <a:t>6. Feature </a:t>
-            </a:r>
-            <a:r>
-              <a:rPr lang="en-US" sz="1800" b="1" dirty="0" smtClean="0"/>
-              <a:t>Extraction</a:t>
+              <a:t>6. Feature Extraction</a:t>
             </a:r>
           </a:p>
           <a:p>
@@ -12436,17 +12431,7 @@
                 <a:latin typeface="Times New Roman"/>
                 <a:cs typeface="Times New Roman"/>
               </a:rPr>
-              <a:t>It </a:t>
-            </a:r>
-            <a:r>
-              <a:rPr lang="en-US" dirty="0">
-                <a:solidFill>
-                  <a:schemeClr val="tx1"/>
-                </a:solidFill>
-                <a:latin typeface="Times New Roman"/>
-                <a:cs typeface="Times New Roman"/>
-              </a:rPr>
-              <a:t>is expressed as the distance of the boundary points, from the centroid (</a:t>
+              <a:t>It is expressed as the distance of the boundary points, from the centroid (</a:t>
             </a:r>
             <a:r>
               <a:rPr lang="en-US" dirty="0" err="1">
@@ -13298,6 +13283,45 @@
           </a:prstGeom>
         </p:spPr>
       </p:pic>
+      <p:sp>
+        <p:nvSpPr>
+          <p:cNvPr id="41" name="Text Placeholder 6"/>
+          <p:cNvSpPr>
+            <a:spLocks noGrp="1"/>
+          </p:cNvSpPr>
+          <p:nvPr>
+            <p:ph type="body" sz="quarter" idx="21"/>
+          </p:nvPr>
+        </p:nvSpPr>
+        <p:spPr>
+          <a:xfrm>
+            <a:off x="15254127" y="19349876"/>
+            <a:ext cx="4441156" cy="849417"/>
+          </a:xfrm>
+        </p:spPr>
+        <p:txBody>
+          <a:bodyPr/>
+          <a:lstStyle/>
+          <a:p>
+            <a:r>
+              <a:rPr lang="en-US" sz="1600" b="1" dirty="0" smtClean="0"/>
+              <a:t>Add QR code to video </a:t>
+            </a:r>
+            <a:r>
+              <a:rPr lang="en-US" sz="1600" b="1" smtClean="0"/>
+              <a:t>demo </a:t>
+            </a:r>
+            <a:endParaRPr lang="en-US" sz="1600" b="1" i="1" dirty="0"/>
+          </a:p>
+          <a:p>
+            <a:r>
+              <a:rPr lang="en-US" sz="1600" b="1" i="1" dirty="0" smtClean="0"/>
+              <a:t>And references </a:t>
+            </a:r>
+            <a:endParaRPr lang="en-US" sz="1600" b="1" i="1" dirty="0" smtClean="0"/>
+          </a:p>
+        </p:txBody>
+      </p:sp>
     </p:spTree>
     <p:extLst>
       <p:ext uri="{BB962C8B-B14F-4D97-AF65-F5344CB8AC3E}">

</xml_diff>

<commit_message>
poster with video frames grab part with demo added
</commit_message>
<xml_diff>
--- a/project/demoCode/posterPaper/poster.pptx
+++ b/project/demoCode/posterPaper/poster.pptx
@@ -109,7 +109,7 @@
   </p:defaultTextStyle>
   <p:extLst>
     <p:ext uri="{EFAFB233-063F-42B5-8137-9DF3F51BA10A}">
-      <p15:sldGuideLst xmlns="" xmlns:p15="http://schemas.microsoft.com/office/powerpoint/2012/main">
+      <p15:sldGuideLst xmlns:p15="http://schemas.microsoft.com/office/powerpoint/2012/main" xmlns="">
         <p15:guide id="1" orient="horz" pos="3318">
           <p15:clr>
             <a:srgbClr val="A4A3A4"/>
@@ -163,7 +163,7 @@
       </p15:sldGuideLst>
     </p:ext>
     <p:ext uri="{2D200454-40CA-4A62-9FC3-DE9A4176ACB9}">
-      <p15:notesGuideLst xmlns="" xmlns:p15="http://schemas.microsoft.com/office/powerpoint/2012/main">
+      <p15:notesGuideLst xmlns:p15="http://schemas.microsoft.com/office/powerpoint/2012/main" xmlns="">
         <p15:guide id="1" orient="horz" pos="13681">
           <p15:clr>
             <a:srgbClr val="A4A3A4"/>
@@ -5586,7 +5586,7 @@
             <a:fld id="{E6CC2317-6751-4CD4-9995-8782DD78E936}" type="datetimeFigureOut">
               <a:rPr lang="en-US" smtClean="0"/>
               <a:pPr/>
-              <a:t>12/2/15</a:t>
+              <a:t>12/1/15</a:t>
             </a:fld>
             <a:endParaRPr lang="en-US" dirty="0"/>
           </a:p>
@@ -8552,7 +8552,7 @@
               <a:graphicData uri="http://schemas.openxmlformats.org/presentationml/2006/ole">
                 <mc:AlternateContent xmlns:mc="http://schemas.openxmlformats.org/markup-compatibility/2006">
                   <mc:Choice xmlns:v="urn:schemas-microsoft-com:vml" Requires="v">
-                    <p:oleObj spid="_x0000_s1178" name="Image" r:id="rId8" imgW="1828440" imgH="1117440" progId="Photoshop.Image.13">
+                    <p:oleObj spid="_x0000_s1197" name="Image" r:id="rId8" imgW="1828440" imgH="1117440" progId="Photoshop.Image.13">
                       <p:embed/>
                     </p:oleObj>
                   </mc:Choice>
@@ -8609,7 +8609,7 @@
               <a:graphicData uri="http://schemas.openxmlformats.org/presentationml/2006/ole">
                 <mc:AlternateContent xmlns:mc="http://schemas.openxmlformats.org/markup-compatibility/2006">
                   <mc:Choice xmlns:v="urn:schemas-microsoft-com:vml" Requires="v">
-                    <p:oleObj spid="_x0000_s1179" name="Image" r:id="rId10" imgW="1828440" imgH="1117440" progId="Photoshop.Image.13">
+                    <p:oleObj spid="_x0000_s1198" name="Image" r:id="rId10" imgW="1828440" imgH="1117440" progId="Photoshop.Image.13">
                       <p:embed/>
                     </p:oleObj>
                   </mc:Choice>
@@ -9737,7 +9737,7 @@
             <a:graphicData uri="http://schemas.openxmlformats.org/presentationml/2006/ole">
               <mc:AlternateContent xmlns:mc="http://schemas.openxmlformats.org/markup-compatibility/2006">
                 <mc:Choice xmlns:v="urn:schemas-microsoft-com:vml" Requires="v">
-                  <p:oleObj spid="_x0000_s1180" name="Image" r:id="rId12" imgW="4571280" imgH="1688760" progId="Photoshop.Image.13">
+                  <p:oleObj spid="_x0000_s1199" name="Image" r:id="rId12" imgW="4571280" imgH="1688760" progId="Photoshop.Image.13">
                     <p:embed/>
                   </p:oleObj>
                 </mc:Choice>
@@ -9821,7 +9821,7 @@
             <a:graphicData uri="http://schemas.openxmlformats.org/presentationml/2006/ole">
               <mc:AlternateContent xmlns:mc="http://schemas.openxmlformats.org/markup-compatibility/2006">
                 <mc:Choice xmlns:v="urn:schemas-microsoft-com:vml" Requires="v">
-                  <p:oleObj spid="_x0000_s1181" name="Image" r:id="rId15" imgW="1574280" imgH="1053720" progId="Photoshop.Image.13">
+                  <p:oleObj spid="_x0000_s1200" name="Image" r:id="rId15" imgW="1574280" imgH="1053720" progId="Photoshop.Image.13">
                     <p:embed/>
                   </p:oleObj>
                 </mc:Choice>
@@ -10774,6 +10774,7 @@
               <a:rPr lang="en-US" dirty="0" smtClean="0"/>
               <a:t>)</a:t>
             </a:r>
+            <a:endParaRPr lang="en-US" dirty="0" smtClean="0"/>
           </a:p>
           <a:p>
             <a:r>
@@ -10908,8 +10909,8 @@
         </p:blipFill>
         <p:spPr>
           <a:xfrm>
-            <a:off x="15254127" y="13265058"/>
-            <a:ext cx="4580986" cy="1862213"/>
+            <a:off x="15325460" y="14240491"/>
+            <a:ext cx="4305169" cy="1862213"/>
           </a:xfrm>
           <a:prstGeom prst="rect">
             <a:avLst/>
@@ -10938,8 +10939,8 @@
         </p:blipFill>
         <p:spPr>
           <a:xfrm>
-            <a:off x="15254127" y="15555258"/>
-            <a:ext cx="4580985" cy="1869386"/>
+            <a:off x="15325462" y="16102704"/>
+            <a:ext cx="4305167" cy="1869386"/>
           </a:xfrm>
           <a:prstGeom prst="rect">
             <a:avLst/>
@@ -12013,7 +12014,11 @@
           <a:p>
             <a:r>
               <a:rPr lang="en-US" sz="1800" b="1" dirty="0" smtClean="0"/>
-              <a:t>6. Feature Extraction</a:t>
+              <a:t>6. Feature </a:t>
+            </a:r>
+            <a:r>
+              <a:rPr lang="en-US" sz="1800" b="1" dirty="0" smtClean="0"/>
+              <a:t>Extraction</a:t>
             </a:r>
           </a:p>
           <a:p>
@@ -12431,7 +12436,17 @@
                 <a:latin typeface="Times New Roman"/>
                 <a:cs typeface="Times New Roman"/>
               </a:rPr>
-              <a:t>It is expressed as the distance of the boundary points, from the centroid (</a:t>
+              <a:t>It </a:t>
+            </a:r>
+            <a:r>
+              <a:rPr lang="en-US" dirty="0">
+                <a:solidFill>
+                  <a:schemeClr val="tx1"/>
+                </a:solidFill>
+                <a:latin typeface="Times New Roman"/>
+                <a:cs typeface="Times New Roman"/>
+              </a:rPr>
+              <a:t>is expressed as the distance of the boundary points, from the centroid (</a:t>
             </a:r>
             <a:r>
               <a:rPr lang="en-US" dirty="0" err="1">
@@ -12587,7 +12602,7 @@
         <p:spPr>
           <a:xfrm>
             <a:off x="15254127" y="5584679"/>
-            <a:ext cx="4719258" cy="2142772"/>
+            <a:ext cx="4719258" cy="4967467"/>
           </a:xfrm>
         </p:spPr>
         <p:txBody>
@@ -12595,19 +12610,19 @@
           <a:lstStyle/>
           <a:p>
             <a:r>
-              <a:rPr lang="en-US" b="1" dirty="0"/>
+              <a:rPr lang="en-US" sz="1800" b="1" dirty="0"/>
               <a:t>K Nearest </a:t>
             </a:r>
             <a:r>
-              <a:rPr lang="en-US" b="1" dirty="0" smtClean="0"/>
+              <a:rPr lang="en-US" sz="1800" b="1" dirty="0" smtClean="0"/>
               <a:t>Neighbor </a:t>
             </a:r>
             <a:r>
-              <a:rPr lang="en-US" b="1" dirty="0"/>
+              <a:rPr lang="en-US" sz="1800" b="1" dirty="0"/>
               <a:t>based </a:t>
             </a:r>
             <a:r>
-              <a:rPr lang="en-US" b="1" dirty="0" smtClean="0"/>
+              <a:rPr lang="en-US" sz="1800" b="1" dirty="0" smtClean="0"/>
               <a:t>Classification:</a:t>
             </a:r>
           </a:p>
@@ -12620,7 +12635,7 @@
               <a:buChar char="•"/>
             </a:pPr>
             <a:r>
-              <a:rPr lang="en-US" sz="1600" dirty="0"/>
+              <a:rPr lang="en-US" sz="1800" dirty="0"/>
               <a:t>2200 samples of ASL digits, </a:t>
             </a:r>
           </a:p>
@@ -12633,7 +12648,7 @@
               <a:buChar char="•"/>
             </a:pPr>
             <a:r>
-              <a:rPr lang="en-US" sz="1600" dirty="0"/>
+              <a:rPr lang="en-US" sz="1800" dirty="0"/>
               <a:t>training : testing data = 70% : 30% </a:t>
             </a:r>
           </a:p>
@@ -12646,7 +12661,7 @@
               <a:buChar char="•"/>
             </a:pPr>
             <a:r>
-              <a:rPr lang="en-US" sz="1600" dirty="0"/>
+              <a:rPr lang="en-US" sz="1800" dirty="0"/>
               <a:t>~ 95% accuracy when k = 1; </a:t>
             </a:r>
           </a:p>
@@ -12659,7 +12674,7 @@
               <a:buChar char="•"/>
             </a:pPr>
             <a:r>
-              <a:rPr lang="en-US" sz="1600" dirty="0"/>
+              <a:rPr lang="en-US" sz="1800" dirty="0"/>
               <a:t>Accuracy decreases with increasing k.</a:t>
             </a:r>
           </a:p>
@@ -12672,11 +12687,11 @@
               <a:buChar char="•"/>
             </a:pPr>
             <a:r>
-              <a:rPr lang="en-US" sz="1600" dirty="0"/>
+              <a:rPr lang="en-US" sz="1800" dirty="0"/>
               <a:t>Average result obtained around 50-55% ; highest being </a:t>
             </a:r>
             <a:r>
-              <a:rPr lang="en-US" sz="1600" dirty="0" smtClean="0"/>
+              <a:rPr lang="en-US" sz="1800" dirty="0" smtClean="0"/>
               <a:t>65%</a:t>
             </a:r>
           </a:p>
@@ -12746,7 +12761,7 @@
         </p:blipFill>
         <p:spPr>
           <a:xfrm>
-            <a:off x="15371587" y="7479921"/>
+            <a:off x="15371587" y="7703478"/>
             <a:ext cx="4147624" cy="1481862"/>
           </a:xfrm>
           <a:prstGeom prst="rect">
@@ -12764,8 +12779,8 @@
         </p:nvSpPr>
         <p:spPr>
           <a:xfrm>
-            <a:off x="15483005" y="8981745"/>
-            <a:ext cx="4147624" cy="4591980"/>
+            <a:off x="15506556" y="9185340"/>
+            <a:ext cx="4147624" cy="5496843"/>
           </a:xfrm>
           <a:prstGeom prst="rect">
             <a:avLst/>
@@ -12916,14 +12931,14 @@
           </a:lstStyle>
           <a:p>
             <a:r>
-              <a:rPr lang="en-US" b="1" dirty="0"/>
+              <a:rPr lang="en-US" sz="1800" b="1" dirty="0"/>
               <a:t>Neural Network based Supervised Learning</a:t>
             </a:r>
             <a:r>
-              <a:rPr lang="en-US" b="1" dirty="0" smtClean="0"/>
+              <a:rPr lang="en-US" sz="1800" b="1" dirty="0" smtClean="0"/>
               <a:t>:</a:t>
             </a:r>
-            <a:endParaRPr lang="en-US" b="1" dirty="0"/>
+            <a:endParaRPr lang="en-US" sz="1800" b="1" dirty="0"/>
           </a:p>
           <a:p>
             <a:pPr marL="285750" indent="-285750">
@@ -12934,14 +12949,14 @@
               <a:buChar char="•"/>
             </a:pPr>
             <a:r>
-              <a:rPr lang="en-US" sz="1600" dirty="0"/>
+              <a:rPr lang="en-US" sz="1800" dirty="0"/>
               <a:t>Feed forward neural network with sigmoid transfer </a:t>
             </a:r>
             <a:r>
-              <a:rPr lang="en-US" sz="1600" dirty="0" smtClean="0"/>
+              <a:rPr lang="en-US" sz="1800" dirty="0" smtClean="0"/>
               <a:t>function</a:t>
             </a:r>
-            <a:endParaRPr lang="en-US" sz="1600" dirty="0"/>
+            <a:endParaRPr lang="en-US" sz="1800" dirty="0"/>
           </a:p>
           <a:p>
             <a:pPr marL="285750" indent="-285750">
@@ -12952,14 +12967,14 @@
               <a:buChar char="•"/>
             </a:pPr>
             <a:r>
-              <a:rPr lang="en-US" sz="1600" dirty="0"/>
+              <a:rPr lang="en-US" sz="1800" dirty="0"/>
               <a:t>Back propagation algorithm for learning weights and biases for neurons</a:t>
             </a:r>
             <a:r>
-              <a:rPr lang="en-US" sz="1600" dirty="0" smtClean="0"/>
+              <a:rPr lang="en-US" sz="1800" dirty="0" smtClean="0"/>
               <a:t>.</a:t>
             </a:r>
-            <a:endParaRPr lang="en-US" sz="1600" dirty="0"/>
+            <a:endParaRPr lang="en-US" sz="1800" dirty="0"/>
           </a:p>
           <a:p>
             <a:pPr marL="285750" indent="-285750">
@@ -12970,14 +12985,14 @@
               <a:buChar char="•"/>
             </a:pPr>
             <a:r>
-              <a:rPr lang="en-US" sz="1600" dirty="0"/>
+              <a:rPr lang="en-US" sz="1800" dirty="0"/>
               <a:t>Utilized 64 point Fourier Descriptors features per digit with N’ hidden neurons and 11 output neurons (digits 0 to 10) : N=48 with experimentation for reliable </a:t>
             </a:r>
             <a:r>
-              <a:rPr lang="en-US" sz="1600" dirty="0" smtClean="0"/>
+              <a:rPr lang="en-US" sz="1800" dirty="0" smtClean="0"/>
               <a:t>accuracy</a:t>
             </a:r>
-            <a:endParaRPr lang="en-US" sz="1600" dirty="0"/>
+            <a:endParaRPr lang="en-US" sz="1800" dirty="0"/>
           </a:p>
           <a:p>
             <a:pPr marL="285750" indent="-285750">
@@ -12988,14 +13003,14 @@
               <a:buChar char="•"/>
             </a:pPr>
             <a:r>
-              <a:rPr lang="en-US" sz="1600" dirty="0"/>
+              <a:rPr lang="en-US" sz="1800" dirty="0"/>
               <a:t>1600 samples with 65-70% for training, 15% for validation and rest for test</a:t>
             </a:r>
             <a:r>
-              <a:rPr lang="en-US" sz="1600" dirty="0" smtClean="0"/>
+              <a:rPr lang="en-US" sz="1800" dirty="0" smtClean="0"/>
               <a:t>.</a:t>
             </a:r>
-            <a:endParaRPr lang="en-US" sz="1600" dirty="0"/>
+            <a:endParaRPr lang="en-US" sz="1800" dirty="0"/>
           </a:p>
           <a:p>
             <a:pPr marL="285750" indent="-285750">
@@ -13006,14 +13021,14 @@
               <a:buChar char="•"/>
             </a:pPr>
             <a:r>
-              <a:rPr lang="en-US" sz="1600" dirty="0"/>
+              <a:rPr lang="en-US" sz="1800" dirty="0"/>
               <a:t>Average result : 84% on the testing set, 95% on the training set and 86% on the validation</a:t>
             </a:r>
             <a:r>
-              <a:rPr lang="en-US" sz="1600" dirty="0" smtClean="0"/>
+              <a:rPr lang="en-US" sz="1800" dirty="0" smtClean="0"/>
               <a:t>.</a:t>
             </a:r>
-            <a:endParaRPr lang="en-US" sz="1600" dirty="0"/>
+            <a:endParaRPr lang="en-US" sz="1800" dirty="0"/>
           </a:p>
           <a:p>
             <a:pPr marL="285750" indent="-285750">
@@ -13024,7 +13039,7 @@
               <a:buChar char="•"/>
             </a:pPr>
             <a:r>
-              <a:rPr lang="en-US" sz="1600" dirty="0"/>
+              <a:rPr lang="en-US" sz="1800" dirty="0"/>
               <a:t>70-80% accuracy on random set on average.</a:t>
             </a:r>
           </a:p>
@@ -13285,7 +13300,7 @@
       </p:pic>
       <p:sp>
         <p:nvSpPr>
-          <p:cNvPr id="41" name="Text Placeholder 6"/>
+          <p:cNvPr id="50" name="Text Placeholder 6"/>
           <p:cNvSpPr>
             <a:spLocks noGrp="1"/>
           </p:cNvSpPr>
@@ -13295,8 +13310,8 @@
         </p:nvSpPr>
         <p:spPr>
           <a:xfrm>
-            <a:off x="15254127" y="19349876"/>
-            <a:ext cx="4441156" cy="849417"/>
+            <a:off x="15325460" y="18827725"/>
+            <a:ext cx="4441156" cy="1391104"/>
           </a:xfrm>
         </p:spPr>
         <p:txBody>
@@ -13305,20 +13320,303 @@
           <a:p>
             <a:r>
               <a:rPr lang="en-US" sz="1600" b="1" dirty="0" smtClean="0"/>
-              <a:t>Add QR code to video </a:t>
-            </a:r>
-            <a:r>
-              <a:rPr lang="en-US" sz="1600" b="1" smtClean="0"/>
-              <a:t>demo </a:t>
-            </a:r>
-            <a:endParaRPr lang="en-US" sz="1600" b="1" i="1" dirty="0"/>
+              <a:t>7</a:t>
+            </a:r>
+            <a:r>
+              <a:rPr lang="en-US" sz="1600" b="1" dirty="0" smtClean="0"/>
+              <a:t>. Video frame gesture detection</a:t>
+            </a:r>
           </a:p>
           <a:p>
-            <a:r>
-              <a:rPr lang="en-US" sz="1600" b="1" i="1" dirty="0" smtClean="0"/>
-              <a:t>And references </a:t>
-            </a:r>
-            <a:endParaRPr lang="en-US" sz="1600" b="1" i="1" dirty="0" smtClean="0"/>
+            <a:pPr marL="285750" indent="-285750">
+              <a:buFont typeface="Arial"/>
+              <a:buChar char="•"/>
+            </a:pPr>
+            <a:r>
+              <a:rPr lang="en-US" sz="1600" dirty="0" smtClean="0"/>
+              <a:t>XOR and frame difference technique tried. </a:t>
+            </a:r>
+          </a:p>
+          <a:p>
+            <a:pPr marL="285750" indent="-285750">
+              <a:buFont typeface="Arial"/>
+              <a:buChar char="•"/>
+            </a:pPr>
+            <a:r>
+              <a:rPr lang="en-US" sz="1600" dirty="0" smtClean="0"/>
+              <a:t>Peak finding algorithm gives us the frames that constitute the actual gestures. </a:t>
+            </a:r>
+            <a:endParaRPr lang="en-US" sz="1600" dirty="0" smtClean="0"/>
+          </a:p>
+        </p:txBody>
+      </p:sp>
+      <p:pic>
+        <p:nvPicPr>
+          <p:cNvPr id="38" name="Picture 37" descr="peaks1.jpg"/>
+          <p:cNvPicPr>
+            <a:picLocks noChangeAspect="1"/>
+          </p:cNvPicPr>
+          <p:nvPr/>
+        </p:nvPicPr>
+        <p:blipFill>
+          <a:blip r:embed="rId25">
+            <a:extLst>
+              <a:ext uri="{28A0092B-C50C-407E-A947-70E740481C1C}">
+                <a14:useLocalDpi xmlns:a14="http://schemas.microsoft.com/office/drawing/2010/main" val="0"/>
+              </a:ext>
+            </a:extLst>
+          </a:blip>
+          <a:stretch>
+            <a:fillRect/>
+          </a:stretch>
+        </p:blipFill>
+        <p:spPr>
+          <a:xfrm>
+            <a:off x="15442919" y="20218830"/>
+            <a:ext cx="2109189" cy="1581892"/>
+          </a:xfrm>
+          <a:prstGeom prst="rect">
+            <a:avLst/>
+          </a:prstGeom>
+        </p:spPr>
+      </p:pic>
+      <p:pic>
+        <p:nvPicPr>
+          <p:cNvPr id="41" name="Picture 40" descr="peaks2.jpg"/>
+          <p:cNvPicPr>
+            <a:picLocks noChangeAspect="1"/>
+          </p:cNvPicPr>
+          <p:nvPr/>
+        </p:nvPicPr>
+        <p:blipFill>
+          <a:blip r:embed="rId26">
+            <a:extLst>
+              <a:ext uri="{28A0092B-C50C-407E-A947-70E740481C1C}">
+                <a14:useLocalDpi xmlns:a14="http://schemas.microsoft.com/office/drawing/2010/main" val="0"/>
+              </a:ext>
+            </a:extLst>
+          </a:blip>
+          <a:stretch>
+            <a:fillRect/>
+          </a:stretch>
+        </p:blipFill>
+        <p:spPr>
+          <a:xfrm>
+            <a:off x="17684747" y="20218829"/>
+            <a:ext cx="2125790" cy="1594343"/>
+          </a:xfrm>
+          <a:prstGeom prst="rect">
+            <a:avLst/>
+          </a:prstGeom>
+        </p:spPr>
+      </p:pic>
+      <p:pic>
+        <p:nvPicPr>
+          <p:cNvPr id="51" name="Picture 50" descr="static_qr_code_without_logo.jpg"/>
+          <p:cNvPicPr>
+            <a:picLocks noChangeAspect="1"/>
+          </p:cNvPicPr>
+          <p:nvPr/>
+        </p:nvPicPr>
+        <p:blipFill>
+          <a:blip r:embed="rId27">
+            <a:extLst>
+              <a:ext uri="{28A0092B-C50C-407E-A947-70E740481C1C}">
+                <a14:useLocalDpi xmlns:a14="http://schemas.microsoft.com/office/drawing/2010/main" val="0"/>
+              </a:ext>
+            </a:extLst>
+          </a:blip>
+          <a:stretch>
+            <a:fillRect/>
+          </a:stretch>
+        </p:blipFill>
+        <p:spPr>
+          <a:xfrm>
+            <a:off x="17165357" y="1166578"/>
+            <a:ext cx="1728986" cy="1728986"/>
+          </a:xfrm>
+          <a:prstGeom prst="rect">
+            <a:avLst/>
+          </a:prstGeom>
+        </p:spPr>
+      </p:pic>
+      <p:sp>
+        <p:nvSpPr>
+          <p:cNvPr id="52" name="Text Placeholder 43"/>
+          <p:cNvSpPr>
+            <a:spLocks noGrp="1"/>
+          </p:cNvSpPr>
+          <p:nvPr>
+            <p:ph type="body" sz="quarter" idx="185"/>
+          </p:nvPr>
+        </p:nvSpPr>
+        <p:spPr>
+          <a:xfrm>
+            <a:off x="16221641" y="482481"/>
+            <a:ext cx="3408988" cy="881597"/>
+          </a:xfrm>
+        </p:spPr>
+        <p:txBody>
+          <a:bodyPr>
+            <a:normAutofit/>
+          </a:bodyPr>
+          <a:lstStyle/>
+          <a:p>
+            <a:r>
+              <a:rPr lang="en-US" sz="3200" dirty="0" smtClean="0"/>
+              <a:t>Demo available @</a:t>
+            </a:r>
+            <a:endParaRPr lang="en-US" sz="3200" dirty="0"/>
+          </a:p>
+        </p:txBody>
+      </p:sp>
+      <p:sp>
+        <p:nvSpPr>
+          <p:cNvPr id="53" name="Rectangle 52"/>
+          <p:cNvSpPr/>
+          <p:nvPr/>
+        </p:nvSpPr>
+        <p:spPr>
+          <a:xfrm>
+            <a:off x="15442920" y="22069402"/>
+            <a:ext cx="4265084" cy="830997"/>
+          </a:xfrm>
+          <a:prstGeom prst="rect">
+            <a:avLst/>
+          </a:prstGeom>
+        </p:spPr>
+        <p:txBody>
+          <a:bodyPr wrap="square">
+            <a:spAutoFit/>
+          </a:bodyPr>
+          <a:lstStyle/>
+          <a:p>
+            <a:r>
+              <a:rPr lang="en-US" sz="1600" i="1" dirty="0">
+                <a:solidFill>
+                  <a:schemeClr val="accent5">
+                    <a:lumMod val="50000"/>
+                  </a:schemeClr>
+                </a:solidFill>
+                <a:latin typeface="Times New Roman" panose="02020603050405020304" pitchFamily="18" charset="0"/>
+                <a:cs typeface="Times New Roman" panose="02020603050405020304" pitchFamily="18" charset="0"/>
+              </a:rPr>
+              <a:t>From left to right (1) </a:t>
+            </a:r>
+            <a:r>
+              <a:rPr lang="en-US" sz="1600" i="1" dirty="0">
+                <a:solidFill>
+                  <a:schemeClr val="accent5">
+                    <a:lumMod val="50000"/>
+                  </a:schemeClr>
+                </a:solidFill>
+                <a:latin typeface="Times New Roman" panose="02020603050405020304" pitchFamily="18" charset="0"/>
+                <a:cs typeface="Times New Roman" panose="02020603050405020304" pitchFamily="18" charset="0"/>
+              </a:rPr>
+              <a:t>p</a:t>
+            </a:r>
+            <a:r>
+              <a:rPr lang="en-US" sz="1600" i="1" dirty="0" smtClean="0">
+                <a:solidFill>
+                  <a:schemeClr val="accent5">
+                    <a:lumMod val="50000"/>
+                  </a:schemeClr>
+                </a:solidFill>
+                <a:latin typeface="Times New Roman" panose="02020603050405020304" pitchFamily="18" charset="0"/>
+                <a:cs typeface="Times New Roman" panose="02020603050405020304" pitchFamily="18" charset="0"/>
+              </a:rPr>
+              <a:t>lot generated using adjacent frame difference. (</a:t>
+            </a:r>
+            <a:r>
+              <a:rPr lang="en-US" sz="1600" i="1" dirty="0">
+                <a:solidFill>
+                  <a:schemeClr val="accent5">
+                    <a:lumMod val="50000"/>
+                  </a:schemeClr>
+                </a:solidFill>
+                <a:latin typeface="Times New Roman" panose="02020603050405020304" pitchFamily="18" charset="0"/>
+                <a:cs typeface="Times New Roman" panose="02020603050405020304" pitchFamily="18" charset="0"/>
+              </a:rPr>
+              <a:t>2) </a:t>
+            </a:r>
+            <a:r>
+              <a:rPr lang="en-US" sz="1600" i="1" dirty="0" smtClean="0">
+                <a:solidFill>
+                  <a:schemeClr val="accent5">
+                    <a:lumMod val="50000"/>
+                  </a:schemeClr>
+                </a:solidFill>
+                <a:latin typeface="Times New Roman" panose="02020603050405020304" pitchFamily="18" charset="0"/>
+                <a:cs typeface="Times New Roman" panose="02020603050405020304" pitchFamily="18" charset="0"/>
+              </a:rPr>
+              <a:t>peak detector output.</a:t>
+            </a:r>
+            <a:endParaRPr lang="en-US" sz="1600" i="1" dirty="0">
+              <a:solidFill>
+                <a:schemeClr val="accent5">
+                  <a:lumMod val="50000"/>
+                </a:schemeClr>
+              </a:solidFill>
+              <a:latin typeface="Times New Roman" panose="02020603050405020304" pitchFamily="18" charset="0"/>
+              <a:cs typeface="Times New Roman" panose="02020603050405020304" pitchFamily="18" charset="0"/>
+            </a:endParaRPr>
+          </a:p>
+        </p:txBody>
+      </p:sp>
+      <p:sp>
+        <p:nvSpPr>
+          <p:cNvPr id="54" name="Rectangle 53"/>
+          <p:cNvSpPr/>
+          <p:nvPr/>
+        </p:nvSpPr>
+        <p:spPr>
+          <a:xfrm>
+            <a:off x="15304224" y="17978451"/>
+            <a:ext cx="4349956" cy="338554"/>
+          </a:xfrm>
+          <a:prstGeom prst="rect">
+            <a:avLst/>
+          </a:prstGeom>
+        </p:spPr>
+        <p:txBody>
+          <a:bodyPr wrap="square">
+            <a:spAutoFit/>
+          </a:bodyPr>
+          <a:lstStyle/>
+          <a:p>
+            <a:r>
+              <a:rPr lang="en-US" sz="1600" b="1" i="1" dirty="0" smtClean="0">
+                <a:solidFill>
+                  <a:schemeClr val="accent5">
+                    <a:lumMod val="50000"/>
+                  </a:schemeClr>
+                </a:solidFill>
+                <a:latin typeface="Times New Roman" panose="02020603050405020304" pitchFamily="18" charset="0"/>
+                <a:cs typeface="Times New Roman" panose="02020603050405020304" pitchFamily="18" charset="0"/>
+              </a:rPr>
+              <a:t>From top to bottom (1) EXPLAIN the plots</a:t>
+            </a:r>
+            <a:r>
+              <a:rPr lang="en-US" sz="1600" i="1" dirty="0" smtClean="0">
+                <a:solidFill>
+                  <a:schemeClr val="accent5">
+                    <a:lumMod val="50000"/>
+                  </a:schemeClr>
+                </a:solidFill>
+                <a:latin typeface="Times New Roman" panose="02020603050405020304" pitchFamily="18" charset="0"/>
+                <a:cs typeface="Times New Roman" panose="02020603050405020304" pitchFamily="18" charset="0"/>
+              </a:rPr>
+              <a:t> </a:t>
+            </a:r>
+            <a:endParaRPr lang="en-US" sz="1600" i="1" dirty="0">
+              <a:solidFill>
+                <a:schemeClr val="accent5">
+                  <a:lumMod val="50000"/>
+                </a:schemeClr>
+              </a:solidFill>
+              <a:latin typeface="Times New Roman" panose="02020603050405020304" pitchFamily="18" charset="0"/>
+              <a:cs typeface="Times New Roman" panose="02020603050405020304" pitchFamily="18" charset="0"/>
+            </a:endParaRPr>
           </a:p>
         </p:txBody>
       </p:sp>

</xml_diff>

<commit_message>
Poster update - rbg formulas and knn pic
</commit_message>
<xml_diff>
--- a/project/demoCode/posterPaper/poster.pptx
+++ b/project/demoCode/posterPaper/poster.pptx
@@ -109,7 +109,7 @@
   </p:defaultTextStyle>
   <p:extLst>
     <p:ext uri="{EFAFB233-063F-42B5-8137-9DF3F51BA10A}">
-      <p15:sldGuideLst xmlns:p15="http://schemas.microsoft.com/office/powerpoint/2012/main" xmlns="">
+      <p15:sldGuideLst xmlns="" xmlns:p15="http://schemas.microsoft.com/office/powerpoint/2012/main">
         <p15:guide id="1" orient="horz" pos="3318">
           <p15:clr>
             <a:srgbClr val="A4A3A4"/>
@@ -163,7 +163,7 @@
       </p15:sldGuideLst>
     </p:ext>
     <p:ext uri="{2D200454-40CA-4A62-9FC3-DE9A4176ACB9}">
-      <p15:notesGuideLst xmlns:p15="http://schemas.microsoft.com/office/powerpoint/2012/main" xmlns="">
+      <p15:notesGuideLst xmlns="" xmlns:p15="http://schemas.microsoft.com/office/powerpoint/2012/main">
         <p15:guide id="1" orient="horz" pos="13681">
           <p15:clr>
             <a:srgbClr val="A4A3A4"/>
@@ -5586,7 +5586,7 @@
             <a:fld id="{E6CC2317-6751-4CD4-9995-8782DD78E936}" type="datetimeFigureOut">
               <a:rPr lang="en-US" smtClean="0"/>
               <a:pPr/>
-              <a:t>12/1/15</a:t>
+              <a:t>03/12/15</a:t>
             </a:fld>
             <a:endParaRPr lang="en-US" dirty="0"/>
           </a:p>
@@ -8552,7 +8552,7 @@
               <a:graphicData uri="http://schemas.openxmlformats.org/presentationml/2006/ole">
                 <mc:AlternateContent xmlns:mc="http://schemas.openxmlformats.org/markup-compatibility/2006">
                   <mc:Choice xmlns:v="urn:schemas-microsoft-com:vml" Requires="v">
-                    <p:oleObj spid="_x0000_s1217" name="Image" r:id="rId8" imgW="1828440" imgH="1117440" progId="Photoshop.Image.13">
+                    <p:oleObj spid="_x0000_s1238" name="Image" r:id="rId8" imgW="1828440" imgH="1117440" progId="Photoshop.Image.13">
                       <p:embed/>
                     </p:oleObj>
                   </mc:Choice>
@@ -8609,7 +8609,7 @@
               <a:graphicData uri="http://schemas.openxmlformats.org/presentationml/2006/ole">
                 <mc:AlternateContent xmlns:mc="http://schemas.openxmlformats.org/markup-compatibility/2006">
                   <mc:Choice xmlns:v="urn:schemas-microsoft-com:vml" Requires="v">
-                    <p:oleObj spid="_x0000_s1218" name="Image" r:id="rId10" imgW="1828440" imgH="1117440" progId="Photoshop.Image.13">
+                    <p:oleObj spid="_x0000_s1239" name="Image" r:id="rId10" imgW="1828440" imgH="1117440" progId="Photoshop.Image.13">
                       <p:embed/>
                     </p:oleObj>
                   </mc:Choice>
@@ -9737,7 +9737,7 @@
             <a:graphicData uri="http://schemas.openxmlformats.org/presentationml/2006/ole">
               <mc:AlternateContent xmlns:mc="http://schemas.openxmlformats.org/markup-compatibility/2006">
                 <mc:Choice xmlns:v="urn:schemas-microsoft-com:vml" Requires="v">
-                  <p:oleObj spid="_x0000_s1219" name="Image" r:id="rId12" imgW="4571280" imgH="1688760" progId="Photoshop.Image.13">
+                  <p:oleObj spid="_x0000_s1240" name="Image" r:id="rId12" imgW="4571280" imgH="1688760" progId="Photoshop.Image.13">
                     <p:embed/>
                   </p:oleObj>
                 </mc:Choice>
@@ -9821,7 +9821,7 @@
             <a:graphicData uri="http://schemas.openxmlformats.org/presentationml/2006/ole">
               <mc:AlternateContent xmlns:mc="http://schemas.openxmlformats.org/markup-compatibility/2006">
                 <mc:Choice xmlns:v="urn:schemas-microsoft-com:vml" Requires="v">
-                  <p:oleObj spid="_x0000_s1220" name="Image" r:id="rId15" imgW="1574280" imgH="1053720" progId="Photoshop.Image.13">
+                  <p:oleObj spid="_x0000_s1241" name="Image" r:id="rId15" imgW="1574280" imgH="1053720" progId="Photoshop.Image.13">
                     <p:embed/>
                   </p:oleObj>
                 </mc:Choice>
@@ -10570,7 +10570,7 @@
         <p:spPr>
           <a:xfrm>
             <a:off x="5323859" y="5686850"/>
-            <a:ext cx="9651689" cy="1526525"/>
+            <a:ext cx="9651689" cy="3188519"/>
           </a:xfrm>
         </p:spPr>
         <p:txBody>
@@ -10601,20 +10601,74 @@
             </a:r>
             <a:r>
               <a:rPr lang="en-US" sz="1800" dirty="0"/>
-              <a:t>it satisfies an OR condition of the following formulas in RGB space and </a:t>
-            </a:r>
-            <a:r>
-              <a:rPr lang="en-US" sz="1800" dirty="0" err="1"/>
-              <a:t>YCbCr</a:t>
-            </a:r>
+              <a:t>it satisfies an OR condition of the following formulas in RGB space and YCbCr </a:t>
+            </a:r>
+            <a:r>
+              <a:rPr lang="en-US" sz="1800" dirty="0" smtClean="0"/>
+              <a:t>space</a:t>
+            </a:r>
+            <a:r>
+              <a:rPr lang="en-US" sz="1800" dirty="0" smtClean="0"/>
+              <a:t>.</a:t>
+            </a:r>
+          </a:p>
+          <a:p>
+            <a:pPr marL="285750" indent="-285750">
+              <a:buFont typeface="Arial"/>
+              <a:buChar char="•"/>
+            </a:pPr>
+            <a:endParaRPr lang="en-US" sz="1800" dirty="0" smtClean="0"/>
+          </a:p>
+          <a:p>
+            <a:r>
+              <a:rPr lang="en-US" sz="1800" dirty="0" smtClean="0"/>
+              <a:t>     R &gt; 95 &amp; G &gt; 40 &amp; B &gt; 20 &amp;                                                   Y = 0.299R + 0.587G + 0.114B</a:t>
+            </a:r>
+            <a:endParaRPr lang="en-US" sz="1800" dirty="0"/>
+          </a:p>
+          <a:p>
+            <a:r>
+              <a:rPr lang="en-US" sz="1800" dirty="0" smtClean="0"/>
+              <a:t>     Max{R,G,B} – Min{R,G,B} &gt; 15 &amp;           </a:t>
+            </a:r>
+            <a:r>
+              <a:rPr lang="en-US" sz="1800" i="1" dirty="0" smtClean="0"/>
+              <a:t>OR                    </a:t>
+            </a:r>
+            <a:r>
+              <a:rPr lang="en-US" sz="1800" dirty="0" smtClean="0"/>
+              <a:t>Cr = 128 + 0.5R – 0.418G – 0.081B</a:t>
+            </a:r>
+            <a:endParaRPr lang="en-US" sz="1800" i="1" dirty="0" smtClean="0"/>
+          </a:p>
+          <a:p>
             <a:r>
               <a:rPr lang="en-US" sz="1800" dirty="0"/>
               <a:t> </a:t>
             </a:r>
             <a:r>
               <a:rPr lang="en-US" sz="1800" dirty="0" smtClean="0"/>
-              <a:t>space. </a:t>
-            </a:r>
+              <a:t>    |R – G| &gt; 15 &amp; R &gt; G &amp; R &gt; B                                              Cb = 128 – 0.168R – 0.331G + 0.5B</a:t>
+            </a:r>
+          </a:p>
+          <a:p>
+            <a:r>
+              <a:rPr lang="en-US" sz="1800" dirty="0"/>
+              <a:t>	</a:t>
+            </a:r>
+            <a:r>
+              <a:rPr lang="en-US" sz="1800" dirty="0"/>
+              <a:t> </a:t>
+            </a:r>
+            <a:r>
+              <a:rPr lang="en-US" sz="1800" dirty="0" smtClean="0"/>
+              <a:t>                                          </a:t>
+            </a:r>
+            <a:r>
+              <a:rPr lang="en-US" sz="1800" dirty="0" smtClean="0"/>
+              <a:t>85 &lt; Cb &lt; 135 &amp; 135 &lt; Cr &lt; 180 &amp; Y &gt; 80</a:t>
+            </a:r>
+            <a:endParaRPr lang="en-US" sz="1800" dirty="0" smtClean="0"/>
           </a:p>
           <a:p>
             <a:endParaRPr lang="en-US" sz="1800" dirty="0"/>
@@ -10774,7 +10828,6 @@
               <a:rPr lang="en-US" dirty="0" smtClean="0"/>
               <a:t>)</a:t>
             </a:r>
-            <a:endParaRPr lang="en-US" dirty="0" smtClean="0"/>
           </a:p>
           <a:p>
             <a:r>
@@ -10909,7 +10962,7 @@
         </p:blipFill>
         <p:spPr>
           <a:xfrm>
-            <a:off x="15325460" y="14240491"/>
+            <a:off x="15325460" y="14178324"/>
             <a:ext cx="4305169" cy="1862213"/>
           </a:xfrm>
           <a:prstGeom prst="rect">
@@ -11144,66 +11197,6 @@
           </a:p>
         </p:txBody>
       </p:sp>
-      <p:pic>
-        <p:nvPicPr>
-          <p:cNvPr id="4" name="Picture 3" descr="for.png"/>
-          <p:cNvPicPr>
-            <a:picLocks noChangeAspect="1"/>
-          </p:cNvPicPr>
-          <p:nvPr/>
-        </p:nvPicPr>
-        <p:blipFill>
-          <a:blip r:embed="rId13">
-            <a:extLst>
-              <a:ext uri="{28A0092B-C50C-407E-A947-70E740481C1C}">
-                <a14:useLocalDpi xmlns:a14="http://schemas.microsoft.com/office/drawing/2010/main" val="0"/>
-              </a:ext>
-            </a:extLst>
-          </a:blip>
-          <a:stretch>
-            <a:fillRect/>
-          </a:stretch>
-        </p:blipFill>
-        <p:spPr>
-          <a:xfrm>
-            <a:off x="5979036" y="6844122"/>
-            <a:ext cx="3386258" cy="1130441"/>
-          </a:xfrm>
-          <a:prstGeom prst="rect">
-            <a:avLst/>
-          </a:prstGeom>
-        </p:spPr>
-      </p:pic>
-      <p:pic>
-        <p:nvPicPr>
-          <p:cNvPr id="18" name="Picture 17" descr="for2.png"/>
-          <p:cNvPicPr>
-            <a:picLocks noChangeAspect="1"/>
-          </p:cNvPicPr>
-          <p:nvPr/>
-        </p:nvPicPr>
-        <p:blipFill>
-          <a:blip r:embed="rId14">
-            <a:extLst>
-              <a:ext uri="{28A0092B-C50C-407E-A947-70E740481C1C}">
-                <a14:useLocalDpi xmlns:a14="http://schemas.microsoft.com/office/drawing/2010/main" val="0"/>
-              </a:ext>
-            </a:extLst>
-          </a:blip>
-          <a:stretch>
-            <a:fillRect/>
-          </a:stretch>
-        </p:blipFill>
-        <p:spPr>
-          <a:xfrm>
-            <a:off x="10516416" y="6898601"/>
-            <a:ext cx="2876936" cy="1130441"/>
-          </a:xfrm>
-          <a:prstGeom prst="rect">
-            <a:avLst/>
-          </a:prstGeom>
-        </p:spPr>
-      </p:pic>
       <p:sp>
         <p:nvSpPr>
           <p:cNvPr id="23" name="Rectangle 22"/>
@@ -11212,7 +11205,7 @@
         </p:nvSpPr>
         <p:spPr>
           <a:xfrm>
-            <a:off x="6437640" y="8011397"/>
+            <a:off x="6124049" y="8059802"/>
             <a:ext cx="2550874" cy="353943"/>
           </a:xfrm>
           <a:prstGeom prst="rect">
@@ -11289,7 +11282,7 @@
         </p:nvSpPr>
         <p:spPr>
           <a:xfrm>
-            <a:off x="10842478" y="8029042"/>
+            <a:off x="11719097" y="8349488"/>
             <a:ext cx="2550874" cy="353943"/>
           </a:xfrm>
           <a:prstGeom prst="rect">
@@ -11303,18 +11296,6 @@
           <a:lstStyle/>
           <a:p>
             <a:r>
-              <a:rPr lang="en-US" sz="1700" b="1" i="1" dirty="0" err="1" smtClean="0">
-                <a:solidFill>
-                  <a:schemeClr val="accent5">
-                    <a:lumMod val="50000"/>
-                  </a:schemeClr>
-                </a:solidFill>
-                <a:latin typeface="Times New Roman" panose="02020603050405020304" pitchFamily="18" charset="0"/>
-                <a:cs typeface="Times New Roman" panose="02020603050405020304" pitchFamily="18" charset="0"/>
-              </a:rPr>
-              <a:t>YCbCr</a:t>
-            </a:r>
-            <a:r>
               <a:rPr lang="en-US" sz="1700" b="1" i="1" dirty="0" smtClean="0">
                 <a:solidFill>
                   <a:schemeClr val="accent5">
@@ -11324,7 +11305,7 @@
                 <a:latin typeface="Times New Roman" panose="02020603050405020304" pitchFamily="18" charset="0"/>
                 <a:cs typeface="Times New Roman" panose="02020603050405020304" pitchFamily="18" charset="0"/>
               </a:rPr>
-              <a:t> based</a:t>
+              <a:t>YCbCr based</a:t>
             </a:r>
             <a:r>
               <a:rPr lang="en-US" sz="1700" b="1" i="1" dirty="0" smtClean="0"/>
@@ -11476,7 +11457,7 @@
           <p:nvPr/>
         </p:nvPicPr>
         <p:blipFill>
-          <a:blip r:embed="rId15">
+          <a:blip r:embed="rId13">
             <a:extLst>
               <a:ext uri="{28A0092B-C50C-407E-A947-70E740481C1C}">
                 <a14:useLocalDpi xmlns:a14="http://schemas.microsoft.com/office/drawing/2010/main" val="0"/>
@@ -11628,7 +11609,7 @@
           <p:nvPr/>
         </p:nvPicPr>
         <p:blipFill>
-          <a:blip r:embed="rId16">
+          <a:blip r:embed="rId14">
             <a:extLst>
               <a:ext uri="{28A0092B-C50C-407E-A947-70E740481C1C}">
                 <a14:useLocalDpi xmlns:a14="http://schemas.microsoft.com/office/drawing/2010/main" val="0"/>
@@ -11856,7 +11837,7 @@
           <p:nvPr/>
         </p:nvPicPr>
         <p:blipFill>
-          <a:blip r:embed="rId17">
+          <a:blip r:embed="rId15">
             <a:extLst>
               <a:ext uri="{28A0092B-C50C-407E-A947-70E740481C1C}">
                 <a14:useLocalDpi xmlns:a14="http://schemas.microsoft.com/office/drawing/2010/main" val="0"/>
@@ -11886,7 +11867,7 @@
           <p:nvPr/>
         </p:nvPicPr>
         <p:blipFill>
-          <a:blip r:embed="rId18">
+          <a:blip r:embed="rId16">
             <a:extLst>
               <a:ext uri="{28A0092B-C50C-407E-A947-70E740481C1C}">
                 <a14:useLocalDpi xmlns:a14="http://schemas.microsoft.com/office/drawing/2010/main" val="0"/>
@@ -11916,7 +11897,7 @@
           <p:nvPr/>
         </p:nvPicPr>
         <p:blipFill>
-          <a:blip r:embed="rId19">
+          <a:blip r:embed="rId17">
             <a:extLst>
               <a:ext uri="{28A0092B-C50C-407E-A947-70E740481C1C}">
                 <a14:useLocalDpi xmlns:a14="http://schemas.microsoft.com/office/drawing/2010/main" val="0"/>
@@ -12010,7 +11991,7 @@
         <p:spPr>
           <a:xfrm>
             <a:off x="5406888" y="21323965"/>
-            <a:ext cx="9257152" cy="6223196"/>
+            <a:ext cx="9257152" cy="6537127"/>
           </a:xfrm>
         </p:spPr>
         <p:txBody>
@@ -12019,11 +12000,7 @@
           <a:p>
             <a:r>
               <a:rPr lang="en-US" sz="1800" b="1" dirty="0" smtClean="0"/>
-              <a:t>6. Feature </a:t>
-            </a:r>
-            <a:r>
-              <a:rPr lang="en-US" sz="1800" b="1" dirty="0" smtClean="0"/>
-              <a:t>Extraction</a:t>
+              <a:t>6. Feature Extraction</a:t>
             </a:r>
           </a:p>
           <a:p>
@@ -12187,6 +12164,10 @@
               <a:t>                              </a:t>
             </a:r>
             <a:r>
+              <a:rPr lang="en-US" sz="1800" dirty="0" smtClean="0"/>
+              <a:t>	</a:t>
+            </a:r>
+            <a:r>
               <a:rPr lang="en-US" sz="1800" b="1" i="1" dirty="0" smtClean="0"/>
               <a:t>z</a:t>
             </a:r>
@@ -12228,16 +12209,12 @@
               <a:t>eliminate the effect of bias, the coordinates are shifted by subtracting the centroid </a:t>
             </a:r>
             <a:r>
-              <a:rPr lang="en-US" dirty="0" err="1" smtClean="0">
+              <a:rPr lang="en-US" dirty="0" smtClean="0">
                 <a:latin typeface="Times"/>
                 <a:cs typeface="Times"/>
               </a:rPr>
               <a:t>i.e</a:t>
             </a:r>
-            <a:endParaRPr lang="en-US" dirty="0" smtClean="0">
-              <a:latin typeface="Times"/>
-              <a:cs typeface="Times"/>
-            </a:endParaRPr>
           </a:p>
           <a:p>
             <a:pPr lvl="2" indent="0">
@@ -12268,6 +12245,30 @@
               <a:t>   </a:t>
             </a:r>
             <a:r>
+              <a:rPr lang="en-US" b="1" dirty="0">
+                <a:solidFill>
+                  <a:schemeClr val="bg2">
+                    <a:lumMod val="25000"/>
+                  </a:schemeClr>
+                </a:solidFill>
+                <a:latin typeface="Times"/>
+                <a:cs typeface="Times"/>
+              </a:rPr>
+              <a:t> </a:t>
+            </a:r>
+            <a:r>
+              <a:rPr lang="en-US" b="1" dirty="0" smtClean="0">
+                <a:solidFill>
+                  <a:schemeClr val="bg2">
+                    <a:lumMod val="25000"/>
+                  </a:schemeClr>
+                </a:solidFill>
+                <a:latin typeface="Times"/>
+                <a:cs typeface="Times"/>
+              </a:rPr>
+              <a:t>              	</a:t>
+            </a:r>
+            <a:r>
               <a:rPr lang="en-US" b="1" i="1" dirty="0" smtClean="0">
                 <a:solidFill>
                   <a:schemeClr val="bg2">
@@ -12289,67 +12290,7 @@
                 <a:latin typeface="Times"/>
                 <a:cs typeface="Times"/>
               </a:rPr>
-              <a:t>(t) = [x(t) - </a:t>
-            </a:r>
-            <a:r>
-              <a:rPr lang="en-US" b="1" i="1" dirty="0" err="1">
-                <a:solidFill>
-                  <a:schemeClr val="bg2">
-                    <a:lumMod val="25000"/>
-                  </a:schemeClr>
-                </a:solidFill>
-                <a:latin typeface="Times"/>
-                <a:cs typeface="Times"/>
-              </a:rPr>
-              <a:t>x_c</a:t>
-            </a:r>
-            <a:r>
-              <a:rPr lang="en-US" b="1" i="1" dirty="0">
-                <a:solidFill>
-                  <a:schemeClr val="bg2">
-                    <a:lumMod val="25000"/>
-                  </a:schemeClr>
-                </a:solidFill>
-                <a:latin typeface="Times"/>
-                <a:cs typeface="Times"/>
-              </a:rPr>
-              <a:t>] + </a:t>
-            </a:r>
-            <a:r>
-              <a:rPr lang="en-US" b="1" i="1" dirty="0" err="1">
-                <a:solidFill>
-                  <a:schemeClr val="bg2">
-                    <a:lumMod val="25000"/>
-                  </a:schemeClr>
-                </a:solidFill>
-                <a:latin typeface="Times"/>
-                <a:cs typeface="Times"/>
-              </a:rPr>
-              <a:t>i</a:t>
-            </a:r>
-            <a:r>
-              <a:rPr lang="en-US" b="1" i="1" dirty="0">
-                <a:solidFill>
-                  <a:schemeClr val="bg2">
-                    <a:lumMod val="25000"/>
-                  </a:schemeClr>
-                </a:solidFill>
-                <a:latin typeface="Times"/>
-                <a:cs typeface="Times"/>
-              </a:rPr>
-              <a:t>[y(t) - </a:t>
-            </a:r>
-            <a:r>
-              <a:rPr lang="en-US" b="1" i="1" dirty="0" err="1">
-                <a:solidFill>
-                  <a:schemeClr val="bg2">
-                    <a:lumMod val="25000"/>
-                  </a:schemeClr>
-                </a:solidFill>
-                <a:latin typeface="Times"/>
-                <a:cs typeface="Times"/>
-              </a:rPr>
-              <a:t>y_c</a:t>
+              <a:t>(t) = [x(t) - x_c] + i[y(t) - y_c</a:t>
             </a:r>
             <a:r>
               <a:rPr lang="en-US" b="1" i="1" dirty="0" smtClean="0">
@@ -12363,13 +12304,15 @@
               </a:rPr>
               <a:t>]</a:t>
             </a:r>
-            <a:r>
-              <a:rPr lang="en-US" i="1" dirty="0" smtClean="0">
-                <a:latin typeface="Times"/>
-                <a:cs typeface="Times"/>
-              </a:rPr>
-              <a:t>, </a:t>
-            </a:r>
+            <a:endParaRPr lang="en-US" i="1" dirty="0" smtClean="0">
+              <a:latin typeface="Times"/>
+              <a:cs typeface="Times"/>
+            </a:endParaRPr>
+          </a:p>
+          <a:p>
+            <a:pPr lvl="2" indent="0">
+              <a:buNone/>
+            </a:pPr>
             <a:r>
               <a:rPr lang="en-US" dirty="0" smtClean="0">
                 <a:latin typeface="Times"/>
@@ -12382,21 +12325,7 @@
                 <a:latin typeface="Times"/>
                 <a:cs typeface="Times"/>
               </a:rPr>
-              <a:t>(</a:t>
-            </a:r>
-            <a:r>
-              <a:rPr lang="en-US" dirty="0" err="1">
-                <a:latin typeface="Times"/>
-                <a:cs typeface="Times"/>
-              </a:rPr>
-              <a:t>x_c,y_c</a:t>
-            </a:r>
-            <a:r>
-              <a:rPr lang="en-US" dirty="0">
-                <a:latin typeface="Times"/>
-                <a:cs typeface="Times"/>
-              </a:rPr>
-              <a:t>) is the centroid of the shape. </a:t>
+              <a:t>(x_c,y_c) is the centroid of the shape. </a:t>
             </a:r>
             <a:r>
               <a:rPr lang="en-US" dirty="0" smtClean="0">
@@ -12441,63 +12370,23 @@
                 <a:latin typeface="Times New Roman"/>
                 <a:cs typeface="Times New Roman"/>
               </a:rPr>
-              <a:t>It </a:t>
-            </a:r>
-            <a:r>
-              <a:rPr lang="en-US" dirty="0">
-                <a:solidFill>
-                  <a:schemeClr val="tx1"/>
-                </a:solidFill>
-                <a:latin typeface="Times New Roman"/>
-                <a:cs typeface="Times New Roman"/>
-              </a:rPr>
-              <a:t>is expressed as the distance of the boundary points, from the centroid (</a:t>
-            </a:r>
-            <a:r>
-              <a:rPr lang="en-US" dirty="0" err="1">
-                <a:solidFill>
-                  <a:schemeClr val="tx1"/>
-                </a:solidFill>
-                <a:latin typeface="Times New Roman"/>
-                <a:cs typeface="Times New Roman"/>
-              </a:rPr>
-              <a:t>x_c</a:t>
-            </a:r>
-            <a:r>
-              <a:rPr lang="en-US" dirty="0">
-                <a:solidFill>
-                  <a:schemeClr val="tx1"/>
-                </a:solidFill>
-                <a:latin typeface="Times New Roman"/>
-                <a:cs typeface="Times New Roman"/>
-              </a:rPr>
-              <a:t>, </a:t>
-            </a:r>
-            <a:r>
-              <a:rPr lang="en-US" dirty="0" err="1">
-                <a:solidFill>
-                  <a:schemeClr val="tx1"/>
-                </a:solidFill>
-                <a:latin typeface="Times New Roman"/>
-                <a:cs typeface="Times New Roman"/>
-              </a:rPr>
-              <a:t>y_c</a:t>
-            </a:r>
-            <a:r>
-              <a:rPr lang="en-US" dirty="0">
-                <a:solidFill>
-                  <a:schemeClr val="tx1"/>
-                </a:solidFill>
-                <a:latin typeface="Times New Roman"/>
-                <a:cs typeface="Times New Roman"/>
-              </a:rPr>
-              <a:t>) of the shape </a:t>
+              <a:t>It is expressed as the distance of the boundary points, from the centroid (x_c, y_c) of the shape </a:t>
             </a:r>
           </a:p>
           <a:p>
             <a:pPr lvl="2" indent="0">
               <a:buNone/>
             </a:pPr>
+            <a:r>
+              <a:rPr lang="en-US" b="1" i="1" dirty="0" smtClean="0">
+                <a:solidFill>
+                  <a:srgbClr val="003F75"/>
+                </a:solidFill>
+                <a:latin typeface="Times New Roman"/>
+                <a:cs typeface="Times New Roman"/>
+              </a:rPr>
+              <a:t>	                	 r</a:t>
+            </a:r>
             <a:r>
               <a:rPr lang="en-US" b="1" i="1" dirty="0">
                 <a:solidFill>
@@ -12506,47 +12395,7 @@
                 <a:latin typeface="Times New Roman"/>
                 <a:cs typeface="Times New Roman"/>
               </a:rPr>
-              <a:t>r(t) = ([x(t) - </a:t>
-            </a:r>
-            <a:r>
-              <a:rPr lang="en-US" b="1" i="1" dirty="0" err="1">
-                <a:solidFill>
-                  <a:srgbClr val="003F75"/>
-                </a:solidFill>
-                <a:latin typeface="Times New Roman"/>
-                <a:cs typeface="Times New Roman"/>
-              </a:rPr>
-              <a:t>x_c</a:t>
-            </a:r>
-            <a:r>
-              <a:rPr lang="en-US" b="1" i="1" dirty="0">
-                <a:solidFill>
-                  <a:srgbClr val="003F75"/>
-                </a:solidFill>
-                <a:latin typeface="Times New Roman"/>
-                <a:cs typeface="Times New Roman"/>
-              </a:rPr>
-              <a:t>]^{2} + [y(t) - </a:t>
-            </a:r>
-            <a:r>
-              <a:rPr lang="en-US" b="1" i="1" dirty="0" err="1">
-                <a:solidFill>
-                  <a:srgbClr val="003F75"/>
-                </a:solidFill>
-                <a:latin typeface="Times New Roman"/>
-                <a:cs typeface="Times New Roman"/>
-              </a:rPr>
-              <a:t>y_c</a:t>
-            </a:r>
-            <a:r>
-              <a:rPr lang="en-US" b="1" i="1" dirty="0">
-                <a:solidFill>
-                  <a:srgbClr val="003F75"/>
-                </a:solidFill>
-                <a:latin typeface="Times New Roman"/>
-                <a:cs typeface="Times New Roman"/>
-              </a:rPr>
-              <a:t>]^{2})^{1/2</a:t>
+              <a:t>(t) = ([x(t) - x_c]^{2} + [y(t) - y_c]^{2})^{1/2</a:t>
             </a:r>
             <a:r>
               <a:rPr lang="en-US" b="1" i="1" dirty="0" smtClean="0">
@@ -12640,8 +12489,16 @@
               <a:buChar char="•"/>
             </a:pPr>
             <a:r>
+              <a:rPr lang="en-US" sz="1800" dirty="0" smtClean="0"/>
+              <a:t>38</a:t>
+            </a:r>
+            <a:r>
+              <a:rPr lang="en-US" sz="1800" dirty="0" smtClean="0"/>
+              <a:t>00 </a:t>
+            </a:r>
+            <a:r>
               <a:rPr lang="en-US" sz="1800" dirty="0"/>
-              <a:t>2200 samples of ASL digits, </a:t>
+              <a:t>samples of ASL digits, </a:t>
             </a:r>
           </a:p>
           <a:p>
@@ -12744,36 +12601,6 @@
           </a:p>
         </p:txBody>
       </p:sp>
-      <p:pic>
-        <p:nvPicPr>
-          <p:cNvPr id="47" name="Picture 46" descr="knn.png"/>
-          <p:cNvPicPr>
-            <a:picLocks noChangeAspect="1"/>
-          </p:cNvPicPr>
-          <p:nvPr/>
-        </p:nvPicPr>
-        <p:blipFill>
-          <a:blip r:embed="rId20">
-            <a:extLst>
-              <a:ext uri="{28A0092B-C50C-407E-A947-70E740481C1C}">
-                <a14:useLocalDpi xmlns:a14="http://schemas.microsoft.com/office/drawing/2010/main" val="0"/>
-              </a:ext>
-            </a:extLst>
-          </a:blip>
-          <a:stretch>
-            <a:fillRect/>
-          </a:stretch>
-        </p:blipFill>
-        <p:spPr>
-          <a:xfrm>
-            <a:off x="15385536" y="7703478"/>
-            <a:ext cx="4147624" cy="1481862"/>
-          </a:xfrm>
-          <a:prstGeom prst="rect">
-            <a:avLst/>
-          </a:prstGeom>
-        </p:spPr>
-      </p:pic>
       <p:sp>
         <p:nvSpPr>
           <p:cNvPr id="49" name="Text Placeholder 8"/>
@@ -12785,7 +12612,7 @@
         <p:spPr>
           <a:xfrm>
             <a:off x="15254127" y="9185340"/>
-            <a:ext cx="4400053" cy="5053645"/>
+            <a:ext cx="4400053" cy="5386043"/>
           </a:xfrm>
           <a:prstGeom prst="rect">
             <a:avLst/>
@@ -12935,9 +12762,16 @@
             </a:lvl9pPr>
           </a:lstStyle>
           <a:p>
+            <a:endParaRPr lang="en-US" sz="1800" b="1" dirty="0" smtClean="0"/>
+          </a:p>
+          <a:p>
+            <a:r>
+              <a:rPr lang="en-US" sz="1800" b="1" dirty="0" smtClean="0"/>
+              <a:t>Neural </a:t>
+            </a:r>
             <a:r>
               <a:rPr lang="en-US" sz="1800" b="1" dirty="0"/>
-              <a:t>Neural Network based Supervised Learning</a:t>
+              <a:t>Network based Supervised Learning</a:t>
             </a:r>
             <a:r>
               <a:rPr lang="en-US" sz="1800" b="1" dirty="0" smtClean="0"/>
@@ -13192,7 +13026,7 @@
           <p:nvPr/>
         </p:nvPicPr>
         <p:blipFill>
-          <a:blip r:embed="rId21">
+          <a:blip r:embed="rId18">
             <a:extLst>
               <a:ext uri="{28A0092B-C50C-407E-A947-70E740481C1C}">
                 <a14:useLocalDpi xmlns:a14="http://schemas.microsoft.com/office/drawing/2010/main" val="0"/>
@@ -13222,7 +13056,7 @@
           <p:nvPr/>
         </p:nvPicPr>
         <p:blipFill>
-          <a:blip r:embed="rId22">
+          <a:blip r:embed="rId19">
             <a:extLst>
               <a:ext uri="{28A0092B-C50C-407E-A947-70E740481C1C}">
                 <a14:useLocalDpi xmlns:a14="http://schemas.microsoft.com/office/drawing/2010/main" val="0"/>
@@ -13252,7 +13086,7 @@
           <p:nvPr/>
         </p:nvPicPr>
         <p:blipFill>
-          <a:blip r:embed="rId23">
+          <a:blip r:embed="rId20">
             <a:extLst>
               <a:ext uri="{28A0092B-C50C-407E-A947-70E740481C1C}">
                 <a14:useLocalDpi xmlns:a14="http://schemas.microsoft.com/office/drawing/2010/main" val="0"/>
@@ -13282,7 +13116,7 @@
           <p:nvPr/>
         </p:nvPicPr>
         <p:blipFill>
-          <a:blip r:embed="rId24">
+          <a:blip r:embed="rId21">
             <a:extLst>
               <a:ext uri="{28A0092B-C50C-407E-A947-70E740481C1C}">
                 <a14:useLocalDpi xmlns:a14="http://schemas.microsoft.com/office/drawing/2010/main" val="0"/>
@@ -13355,7 +13189,6 @@
               <a:rPr lang="en-US" sz="1600" dirty="0" smtClean="0"/>
               <a:t>. </a:t>
             </a:r>
-            <a:endParaRPr lang="en-US" sz="1600" dirty="0" smtClean="0"/>
           </a:p>
         </p:txBody>
       </p:sp>
@@ -13368,7 +13201,7 @@
           <p:nvPr/>
         </p:nvPicPr>
         <p:blipFill>
-          <a:blip r:embed="rId25">
+          <a:blip r:embed="rId22">
             <a:extLst>
               <a:ext uri="{28A0092B-C50C-407E-A947-70E740481C1C}">
                 <a14:useLocalDpi xmlns:a14="http://schemas.microsoft.com/office/drawing/2010/main" val="0"/>
@@ -13398,7 +13231,7 @@
           <p:nvPr/>
         </p:nvPicPr>
         <p:blipFill>
-          <a:blip r:embed="rId26">
+          <a:blip r:embed="rId23">
             <a:extLst>
               <a:ext uri="{28A0092B-C50C-407E-A947-70E740481C1C}">
                 <a14:useLocalDpi xmlns:a14="http://schemas.microsoft.com/office/drawing/2010/main" val="0"/>
@@ -13428,7 +13261,7 @@
           <p:nvPr/>
         </p:nvPicPr>
         <p:blipFill>
-          <a:blip r:embed="rId27">
+          <a:blip r:embed="rId24">
             <a:extLst>
               <a:ext uri="{28A0092B-C50C-407E-A947-70E740481C1C}">
                 <a14:useLocalDpi xmlns:a14="http://schemas.microsoft.com/office/drawing/2010/main" val="0"/>
@@ -13510,19 +13343,7 @@
                 <a:latin typeface="Times New Roman" panose="02020603050405020304" pitchFamily="18" charset="0"/>
                 <a:cs typeface="Times New Roman" panose="02020603050405020304" pitchFamily="18" charset="0"/>
               </a:rPr>
-              <a:t>From left to right (1) </a:t>
-            </a:r>
-            <a:r>
-              <a:rPr lang="en-US" sz="1600" i="1" dirty="0">
-                <a:solidFill>
-                  <a:schemeClr val="accent5">
-                    <a:lumMod val="50000"/>
-                  </a:schemeClr>
-                </a:solidFill>
-                <a:latin typeface="Times New Roman" panose="02020603050405020304" pitchFamily="18" charset="0"/>
-                <a:cs typeface="Times New Roman" panose="02020603050405020304" pitchFamily="18" charset="0"/>
-              </a:rPr>
-              <a:t>p</a:t>
+              <a:t>From left to right (1) p</a:t>
             </a:r>
             <a:r>
               <a:rPr lang="en-US" sz="1600" i="1" dirty="0" smtClean="0">
@@ -13629,6 +13450,34 @@
           </a:p>
         </p:txBody>
       </p:sp>
+      <p:pic>
+        <p:nvPicPr>
+          <p:cNvPr id="57" name="Picture 56"/>
+          <p:cNvPicPr/>
+          <p:nvPr/>
+        </p:nvPicPr>
+        <p:blipFill>
+          <a:blip r:embed="rId25">
+            <a:extLst>
+              <a:ext uri="{28A0092B-C50C-407E-A947-70E740481C1C}">
+                <a14:useLocalDpi xmlns:a14="http://schemas.microsoft.com/office/drawing/2010/main" val="0"/>
+              </a:ext>
+            </a:extLst>
+          </a:blip>
+          <a:stretch>
+            <a:fillRect/>
+          </a:stretch>
+        </p:blipFill>
+        <p:spPr>
+          <a:xfrm>
+            <a:off x="15475464" y="7697527"/>
+            <a:ext cx="4028954" cy="1876362"/>
+          </a:xfrm>
+          <a:prstGeom prst="rect">
+            <a:avLst/>
+          </a:prstGeom>
+        </p:spPr>
+      </p:pic>
     </p:spTree>
     <p:extLst>
       <p:ext uri="{BB962C8B-B14F-4D97-AF65-F5344CB8AC3E}">
@@ -13639,11 +13488,11 @@
   <p:clrMapOvr>
     <a:masterClrMapping/>
   </p:clrMapOvr>
-  <mc:AlternateContent xmlns:mc="http://schemas.openxmlformats.org/markup-compatibility/2006">
-    <mc:Choice xmlns:p14="http://schemas.microsoft.com/office/powerpoint/2010/main" Requires="p14">
+  <mc:AlternateContent xmlns:mc="http://schemas.openxmlformats.org/markup-compatibility/2006" xmlns:p14="http://schemas.microsoft.com/office/powerpoint/2010/main">
+    <mc:Choice Requires="p14">
       <p:transition spd="slow" p14:dur="2000"/>
     </mc:Choice>
-    <mc:Fallback>
+    <mc:Fallback xmlns="">
       <p:transition xmlns:p14="http://schemas.microsoft.com/office/powerpoint/2010/main" spd="slow"/>
     </mc:Fallback>
   </mc:AlternateContent>

</xml_diff>

<commit_message>
updated poster and pdf
</commit_message>
<xml_diff>
--- a/project/demoCode/posterPaper/poster.pptx
+++ b/project/demoCode/posterPaper/poster.pptx
@@ -109,7 +109,7 @@
   </p:defaultTextStyle>
   <p:extLst>
     <p:ext uri="{EFAFB233-063F-42B5-8137-9DF3F51BA10A}">
-      <p15:sldGuideLst xmlns:p15="http://schemas.microsoft.com/office/powerpoint/2012/main" xmlns="">
+      <p15:sldGuideLst xmlns:p15="http://schemas.microsoft.com/office/powerpoint/2012/main">
         <p15:guide id="1" orient="horz" pos="3318">
           <p15:clr>
             <a:srgbClr val="A4A3A4"/>
@@ -160,10 +160,55 @@
             <a:srgbClr val="A4A3A4"/>
           </p15:clr>
         </p15:guide>
+        <p15:guide id="11" orient="horz" pos="3134">
+          <p15:clr>
+            <a:srgbClr val="A4A3A4"/>
+          </p15:clr>
+        </p15:guide>
+        <p15:guide id="12" orient="horz" pos="272">
+          <p15:clr>
+            <a:srgbClr val="A4A3A4"/>
+          </p15:clr>
+        </p15:guide>
+        <p15:guide id="13" orient="horz" pos="19040">
+          <p15:clr>
+            <a:srgbClr val="A4A3A4"/>
+          </p15:clr>
+        </p15:guide>
+        <p15:guide id="14" pos="3075">
+          <p15:clr>
+            <a:srgbClr val="A4A3A4"/>
+          </p15:clr>
+        </p15:guide>
+        <p15:guide id="15" pos="9581">
+          <p15:clr>
+            <a:srgbClr val="A4A3A4"/>
+          </p15:clr>
+        </p15:guide>
+        <p15:guide id="16" pos="3246">
+          <p15:clr>
+            <a:srgbClr val="A4A3A4"/>
+          </p15:clr>
+        </p15:guide>
+        <p15:guide id="17" pos="9433">
+          <p15:clr>
+            <a:srgbClr val="A4A3A4"/>
+          </p15:clr>
+        </p15:guide>
+        <p15:guide id="18" pos="12526">
+          <p15:clr>
+            <a:srgbClr val="A4A3A4"/>
+          </p15:clr>
+        </p15:guide>
+        <p15:guide id="19" pos="149">
+          <p15:clr>
+            <a:srgbClr val="A4A3A4"/>
+          </p15:clr>
+        </p15:guide>
       </p15:sldGuideLst>
     </p:ext>
     <p:ext uri="{2D200454-40CA-4A62-9FC3-DE9A4176ACB9}">
-      <p15:notesGuideLst xmlns:p15="http://schemas.microsoft.com/office/powerpoint/2012/main" xmlns="">
+      <p15:notesGuideLst xmlns:p15="http://schemas.microsoft.com/office/powerpoint/2012/main">
         <p15:guide id="1" orient="horz" pos="13681">
           <p15:clr>
             <a:srgbClr val="A4A3A4"/>
@@ -1468,7 +1513,7 @@
   <dgm:whole/>
   <dgm:extLst>
     <a:ext uri="http://schemas.microsoft.com/office/drawing/2008/diagram">
-      <dsp:dataModelExt xmlns:dsp="http://schemas.microsoft.com/office/drawing/2008/diagram" relId="rId12" minVer="http://schemas.openxmlformats.org/drawingml/2006/diagram"/>
+      <dsp:dataModelExt xmlns:dsp="http://schemas.microsoft.com/office/drawing/2008/diagram" relId="rId10" minVer="http://schemas.openxmlformats.org/drawingml/2006/diagram"/>
     </a:ext>
     <a:ext uri="{C62137D5-CB1D-491B-B009-E17868A290BF}">
       <dgm14:recolorImg xmlns:dgm14="http://schemas.microsoft.com/office/drawing/2010/diagram" val="1"/>
@@ -5586,7 +5631,7 @@
             <a:fld id="{E6CC2317-6751-4CD4-9995-8782DD78E936}" type="datetimeFigureOut">
               <a:rPr lang="en-US" smtClean="0"/>
               <a:pPr/>
-              <a:t>03/12/15</a:t>
+              <a:t>12/3/15</a:t>
             </a:fld>
             <a:endParaRPr lang="en-US" dirty="0"/>
           </a:p>
@@ -6957,7 +7002,7 @@
   <p:timing>
     <p:tnLst>
       <p:par>
-        <p:cTn xmlns:p14="http://schemas.microsoft.com/office/powerpoint/2010/main" id="1" dur="indefinite" restart="never" nodeType="tmRoot"/>
+        <p:cTn id="1" dur="indefinite" restart="never" nodeType="tmRoot"/>
       </p:par>
     </p:tnLst>
   </p:timing>
@@ -8552,7 +8597,7 @@
               <a:graphicData uri="http://schemas.openxmlformats.org/presentationml/2006/ole">
                 <mc:AlternateContent xmlns:mc="http://schemas.openxmlformats.org/markup-compatibility/2006">
                   <mc:Choice xmlns:v="urn:schemas-microsoft-com:vml" Requires="v">
-                    <p:oleObj spid="_x0000_s1281" name="Image" r:id="rId8" imgW="1828440" imgH="1117440" progId="Photoshop.Image.13">
+                    <p:oleObj spid="_x0000_s1302" name="Image" r:id="rId8" imgW="1828440" imgH="1117440" progId="Photoshop.Image.13">
                       <p:embed/>
                     </p:oleObj>
                   </mc:Choice>
@@ -8609,7 +8654,7 @@
               <a:graphicData uri="http://schemas.openxmlformats.org/presentationml/2006/ole">
                 <mc:AlternateContent xmlns:mc="http://schemas.openxmlformats.org/markup-compatibility/2006">
                   <mc:Choice xmlns:v="urn:schemas-microsoft-com:vml" Requires="v">
-                    <p:oleObj spid="_x0000_s1282" name="Image" r:id="rId10" imgW="1828440" imgH="1117440" progId="Photoshop.Image.13">
+                    <p:oleObj spid="_x0000_s1303" name="Image" r:id="rId10" imgW="1828440" imgH="1117440" progId="Photoshop.Image.13">
                       <p:embed/>
                     </p:oleObj>
                   </mc:Choice>
@@ -9737,7 +9782,7 @@
             <a:graphicData uri="http://schemas.openxmlformats.org/presentationml/2006/ole">
               <mc:AlternateContent xmlns:mc="http://schemas.openxmlformats.org/markup-compatibility/2006">
                 <mc:Choice xmlns:v="urn:schemas-microsoft-com:vml" Requires="v">
-                  <p:oleObj spid="_x0000_s1283" name="Image" r:id="rId12" imgW="4571280" imgH="1688760" progId="Photoshop.Image.13">
+                  <p:oleObj spid="_x0000_s1304" name="Image" r:id="rId12" imgW="4571280" imgH="1688760" progId="Photoshop.Image.13">
                     <p:embed/>
                   </p:oleObj>
                 </mc:Choice>
@@ -9821,7 +9866,7 @@
             <a:graphicData uri="http://schemas.openxmlformats.org/presentationml/2006/ole">
               <mc:AlternateContent xmlns:mc="http://schemas.openxmlformats.org/markup-compatibility/2006">
                 <mc:Choice xmlns:v="urn:schemas-microsoft-com:vml" Requires="v">
-                  <p:oleObj spid="_x0000_s1284" name="Image" r:id="rId15" imgW="1574280" imgH="1053720" progId="Photoshop.Image.13">
+                  <p:oleObj spid="_x0000_s1305" name="Image" r:id="rId15" imgW="1574280" imgH="1053720" progId="Photoshop.Image.13">
                     <p:embed/>
                   </p:oleObj>
                 </mc:Choice>
@@ -10191,7 +10236,7 @@
   <p:timing>
     <p:tnLst>
       <p:par>
-        <p:cTn xmlns:p14="http://schemas.microsoft.com/office/powerpoint/2010/main" id="1" dur="indefinite" restart="never" nodeType="tmRoot"/>
+        <p:cTn id="1" dur="indefinite" restart="never" nodeType="tmRoot"/>
       </p:par>
     </p:tnLst>
   </p:timing>
@@ -10886,66 +10931,6 @@
           </a:p>
         </p:txBody>
       </p:sp>
-      <p:pic>
-        <p:nvPicPr>
-          <p:cNvPr id="5" name="Picture 4" descr="nn.png"/>
-          <p:cNvPicPr>
-            <a:picLocks noChangeAspect="1"/>
-          </p:cNvPicPr>
-          <p:nvPr/>
-        </p:nvPicPr>
-        <p:blipFill>
-          <a:blip r:embed="rId6">
-            <a:extLst>
-              <a:ext uri="{28A0092B-C50C-407E-A947-70E740481C1C}">
-                <a14:useLocalDpi xmlns:a14="http://schemas.microsoft.com/office/drawing/2010/main" val="0"/>
-              </a:ext>
-            </a:extLst>
-          </a:blip>
-          <a:stretch>
-            <a:fillRect/>
-          </a:stretch>
-        </p:blipFill>
-        <p:spPr>
-          <a:xfrm>
-            <a:off x="15325460" y="14178324"/>
-            <a:ext cx="4305169" cy="1862213"/>
-          </a:xfrm>
-          <a:prstGeom prst="rect">
-            <a:avLst/>
-          </a:prstGeom>
-        </p:spPr>
-      </p:pic>
-      <p:pic>
-        <p:nvPicPr>
-          <p:cNvPr id="22" name="Picture 21" descr="con.png"/>
-          <p:cNvPicPr>
-            <a:picLocks noChangeAspect="1"/>
-          </p:cNvPicPr>
-          <p:nvPr/>
-        </p:nvPicPr>
-        <p:blipFill>
-          <a:blip r:embed="rId7">
-            <a:extLst>
-              <a:ext uri="{28A0092B-C50C-407E-A947-70E740481C1C}">
-                <a14:useLocalDpi xmlns:a14="http://schemas.microsoft.com/office/drawing/2010/main" val="0"/>
-              </a:ext>
-            </a:extLst>
-          </a:blip>
-          <a:stretch>
-            <a:fillRect/>
-          </a:stretch>
-        </p:blipFill>
-        <p:spPr>
-          <a:xfrm>
-            <a:off x="15325462" y="16102704"/>
-            <a:ext cx="4305167" cy="1869386"/>
-          </a:xfrm>
-          <a:prstGeom prst="rect">
-            <a:avLst/>
-          </a:prstGeom>
-        </p:spPr>
-      </p:pic>
       <p:graphicFrame>
         <p:nvGraphicFramePr>
           <p:cNvPr id="25" name="Diagram 24"/>
@@ -10964,7 +10949,7 @@
         </p:xfrm>
         <a:graphic>
           <a:graphicData uri="http://schemas.openxmlformats.org/drawingml/2006/diagram">
-            <dgm:relIds xmlns:dgm="http://schemas.openxmlformats.org/drawingml/2006/diagram" xmlns:r="http://schemas.openxmlformats.org/officeDocument/2006/relationships" r:dm="rId8" r:lo="rId9" r:qs="rId10" r:cs="rId11"/>
+            <dgm:relIds xmlns:dgm="http://schemas.openxmlformats.org/drawingml/2006/diagram" xmlns:r="http://schemas.openxmlformats.org/officeDocument/2006/relationships" r:dm="rId6" r:lo="rId7" r:qs="rId8" r:cs="rId9"/>
           </a:graphicData>
         </a:graphic>
       </p:graphicFrame>
@@ -11407,7 +11392,7 @@
         <p:spPr>
           <a:xfrm>
             <a:off x="5323860" y="10971935"/>
-            <a:ext cx="4441156" cy="3006931"/>
+            <a:ext cx="4441156" cy="3213141"/>
           </a:xfrm>
         </p:spPr>
         <p:txBody>
@@ -11415,7 +11400,7 @@
           <a:lstStyle/>
           <a:p>
             <a:r>
-              <a:rPr lang="en-US" sz="1800" b="1" dirty="0" smtClean="0"/>
+              <a:rPr lang="en-US" sz="1600" b="1" dirty="0" smtClean="0"/>
               <a:t>3. Wrist Cropping</a:t>
             </a:r>
           </a:p>
@@ -11425,7 +11410,7 @@
               <a:buChar char="•"/>
             </a:pPr>
             <a:r>
-              <a:rPr lang="en-US" sz="1800" dirty="0" smtClean="0"/>
+              <a:rPr lang="en-US" sz="1600" dirty="0" smtClean="0"/>
               <a:t>Computationally intensive with hand tilt.</a:t>
             </a:r>
           </a:p>
@@ -11435,8 +11420,12 @@
               <a:buChar char="•"/>
             </a:pPr>
             <a:r>
-              <a:rPr lang="en-US" sz="1800" dirty="0" smtClean="0"/>
-              <a:t>PCA application on entire hand was not sufficient. </a:t>
+              <a:rPr lang="en-US" sz="1600" dirty="0" smtClean="0"/>
+              <a:t>PCA application on entire hand was not sufficient</a:t>
+            </a:r>
+            <a:r>
+              <a:rPr lang="en-US" sz="1600" dirty="0" smtClean="0"/>
+              <a:t>.</a:t>
             </a:r>
           </a:p>
           <a:p>
@@ -11445,16 +11434,32 @@
               <a:buChar char="•"/>
             </a:pPr>
             <a:r>
-              <a:rPr lang="en-US" sz="1800" dirty="0" smtClean="0"/>
-              <a:t>PCA on wrist band hand helped to find principle component orientation making hand rotation </a:t>
-            </a:r>
-            <a:r>
-              <a:rPr lang="en-US" sz="1800" dirty="0"/>
+              <a:rPr lang="en-US" sz="1600" dirty="0" smtClean="0"/>
+              <a:t>PCA </a:t>
+            </a:r>
+            <a:r>
+              <a:rPr lang="en-US" sz="1600" dirty="0" smtClean="0"/>
+              <a:t>on wrist band </a:t>
+            </a:r>
+            <a:r>
+              <a:rPr lang="en-US" sz="1600" dirty="0" smtClean="0"/>
+              <a:t>helped </a:t>
+            </a:r>
+            <a:r>
+              <a:rPr lang="en-US" sz="1600" dirty="0" smtClean="0"/>
+              <a:t>to find principle component orientation making hand rotation </a:t>
+            </a:r>
+            <a:r>
+              <a:rPr lang="en-US" sz="1600" dirty="0"/>
               <a:t>invariant </a:t>
             </a:r>
             <a:r>
-              <a:rPr lang="en-US" sz="1800" dirty="0" smtClean="0"/>
-              <a:t>analysis.</a:t>
+              <a:rPr lang="en-US" sz="1600" dirty="0" smtClean="0"/>
+              <a:t>analysis</a:t>
+            </a:r>
+            <a:r>
+              <a:rPr lang="en-US" sz="1600" dirty="0" smtClean="0"/>
+              <a:t>.</a:t>
             </a:r>
           </a:p>
           <a:p>
@@ -11463,17 +11468,22 @@
               <a:buChar char="•"/>
             </a:pPr>
             <a:r>
-              <a:rPr lang="en-US" sz="1800" dirty="0" smtClean="0"/>
-              <a:t>Simple width </a:t>
-            </a:r>
-            <a:r>
-              <a:rPr lang="en-US" sz="1800" dirty="0"/>
-              <a:t>based wrist cropping </a:t>
-            </a:r>
-            <a:r>
-              <a:rPr lang="en-US" sz="1800" dirty="0" smtClean="0"/>
-              <a:t> cropping algorithm now can be applied. </a:t>
-            </a:r>
+              <a:rPr lang="en-US" sz="1600" dirty="0"/>
+              <a:t>Wrist cropping is significantly less computation intensive if the forearm and wrist </a:t>
+            </a:r>
+            <a:r>
+              <a:rPr lang="en-US" sz="1600" dirty="0" smtClean="0"/>
+              <a:t>orientation </a:t>
+            </a:r>
+            <a:r>
+              <a:rPr lang="en-US" sz="1600" dirty="0"/>
+              <a:t>is known. A simple width based wrist detection algorithm can then be applied</a:t>
+            </a:r>
+            <a:r>
+              <a:rPr lang="en-US" sz="1600" dirty="0" smtClean="0"/>
+              <a:t>.</a:t>
+            </a:r>
+            <a:endParaRPr lang="en-US" sz="1600" dirty="0"/>
           </a:p>
         </p:txBody>
       </p:sp>
@@ -11489,7 +11499,7 @@
         </p:nvSpPr>
         <p:spPr>
           <a:xfrm>
-            <a:off x="5588439" y="13978421"/>
+            <a:off x="5588439" y="14194147"/>
             <a:ext cx="9075601" cy="1046394"/>
           </a:xfrm>
         </p:spPr>
@@ -11545,8 +11555,8 @@
         </p:nvSpPr>
         <p:spPr>
           <a:xfrm>
-            <a:off x="5323860" y="15024815"/>
-            <a:ext cx="4285896" cy="3711739"/>
+            <a:off x="5406888" y="15070320"/>
+            <a:ext cx="4367818" cy="3711739"/>
           </a:xfrm>
         </p:spPr>
         <p:txBody>
@@ -11715,7 +11725,15 @@
             </a:pPr>
             <a:r>
               <a:rPr lang="en-US" sz="1800" dirty="0"/>
-              <a:t>Assumption that the palm and fingers form the biggest boundary, which is true most of the time. Such a method helps us in eliminating and skin color background objects (like a distant face </a:t>
+              <a:t>Assumption that the palm and fingers form the biggest boundary, which is true most of the time. Such a method helps us in </a:t>
+            </a:r>
+            <a:r>
+              <a:rPr lang="en-US" sz="1800" dirty="0" smtClean="0"/>
+              <a:t>eliminating skin </a:t>
+            </a:r>
+            <a:r>
+              <a:rPr lang="en-US" sz="1800" dirty="0"/>
+              <a:t>color background objects (like a distant face </a:t>
             </a:r>
             <a:r>
               <a:rPr lang="en-US" sz="1800" dirty="0" err="1"/>
@@ -11829,7 +11847,7 @@
         <p:spPr>
           <a:xfrm>
             <a:off x="5406888" y="21323965"/>
-            <a:ext cx="9257152" cy="6537127"/>
+            <a:ext cx="9257152" cy="6537128"/>
           </a:xfrm>
         </p:spPr>
         <p:txBody>
@@ -11920,10 +11938,14 @@
             </a:r>
             <a:r>
               <a:rPr lang="en-US" sz="1800" dirty="0" smtClean="0"/>
-              <a:t>were tried and Arc </a:t>
-            </a:r>
-            <a:r>
-              <a:rPr lang="en-US" sz="1800" dirty="0"/>
+              <a:t>were tried and </a:t>
+            </a:r>
+            <a:r>
+              <a:rPr lang="en-US" sz="1800" b="1" dirty="0" smtClean="0"/>
+              <a:t>Arc </a:t>
+            </a:r>
+            <a:r>
+              <a:rPr lang="en-US" sz="1800" b="1" dirty="0"/>
               <a:t>length </a:t>
             </a:r>
             <a:r>
@@ -12204,13 +12226,33 @@
                 <a:latin typeface="Times New Roman"/>
                 <a:cs typeface="Times New Roman"/>
               </a:rPr>
-              <a:t>It is expressed as the distance of the boundary points, from the centroid (x_c, y_c) of the shape </a:t>
+              <a:t>It is expressed as the distance of the boundary points, from the centroid (x_c, y_c) of the </a:t>
+            </a:r>
+            <a:r>
+              <a:rPr lang="en-US" dirty="0" smtClean="0">
+                <a:solidFill>
+                  <a:schemeClr val="tx1"/>
+                </a:solidFill>
+                <a:latin typeface="Times New Roman"/>
+                <a:cs typeface="Times New Roman"/>
+              </a:rPr>
+              <a:t>shape </a:t>
             </a:r>
           </a:p>
           <a:p>
             <a:pPr lvl="2" indent="0">
               <a:buNone/>
             </a:pPr>
+            <a:r>
+              <a:rPr lang="en-US" b="1" i="1" dirty="0">
+                <a:solidFill>
+                  <a:srgbClr val="003F75"/>
+                </a:solidFill>
+                <a:latin typeface="Times New Roman"/>
+                <a:cs typeface="Times New Roman"/>
+              </a:rPr>
+              <a:t>	</a:t>
+            </a:r>
             <a:r>
               <a:rPr lang="en-US" b="1" i="1" dirty="0" smtClean="0">
                 <a:solidFill>
@@ -12219,17 +12261,17 @@
                 <a:latin typeface="Times New Roman"/>
                 <a:cs typeface="Times New Roman"/>
               </a:rPr>
-              <a:t>	                	 r</a:t>
-            </a:r>
-            <a:r>
-              <a:rPr lang="en-US" b="1" i="1" dirty="0">
+              <a:t> r(t) = ([x(t) - </a:t>
+            </a:r>
+            <a:r>
+              <a:rPr lang="en-US" b="1" i="1" dirty="0" err="1" smtClean="0">
                 <a:solidFill>
                   <a:srgbClr val="003F75"/>
                 </a:solidFill>
                 <a:latin typeface="Times New Roman"/>
                 <a:cs typeface="Times New Roman"/>
               </a:rPr>
-              <a:t>(t) = ([x(t) - x_c]^{2} + [y(t) - y_c]^{2})^{1/2</a:t>
+              <a:t>x_c</a:t>
             </a:r>
             <a:r>
               <a:rPr lang="en-US" b="1" i="1" dirty="0" smtClean="0">
@@ -12239,9 +12281,29 @@
                 <a:latin typeface="Times New Roman"/>
                 <a:cs typeface="Times New Roman"/>
               </a:rPr>
-              <a:t>}</a:t>
-            </a:r>
-            <a:endParaRPr lang="en-US" sz="1800" dirty="0"/>
+              <a:t>]^{2} + [y(t) - </a:t>
+            </a:r>
+            <a:r>
+              <a:rPr lang="en-US" b="1" i="1" dirty="0" err="1" smtClean="0">
+                <a:solidFill>
+                  <a:srgbClr val="003F75"/>
+                </a:solidFill>
+                <a:latin typeface="Times New Roman"/>
+                <a:cs typeface="Times New Roman"/>
+              </a:rPr>
+              <a:t>y_c</a:t>
+            </a:r>
+            <a:r>
+              <a:rPr lang="en-US" b="1" i="1" dirty="0" smtClean="0">
+                <a:solidFill>
+                  <a:srgbClr val="003F75"/>
+                </a:solidFill>
+                <a:latin typeface="Times New Roman"/>
+                <a:cs typeface="Times New Roman"/>
+              </a:rPr>
+              <a:t>]^{2})^{1/2}</a:t>
+            </a:r>
+            <a:endParaRPr lang="en-US" sz="1800" dirty="0" smtClean="0"/>
           </a:p>
           <a:p>
             <a:pPr marL="285750" indent="-285750">
@@ -12249,8 +12311,12 @@
               <a:buChar char="•"/>
             </a:pPr>
             <a:r>
+              <a:rPr lang="en-US" sz="1800" b="1" dirty="0" smtClean="0"/>
+              <a:t>Discrete </a:t>
+            </a:r>
+            <a:r>
               <a:rPr lang="en-US" sz="1800" b="1" dirty="0"/>
-              <a:t>Discrete Fourier </a:t>
+              <a:t>Fourier </a:t>
             </a:r>
             <a:r>
               <a:rPr lang="en-US" sz="1800" b="1" dirty="0" smtClean="0"/>
@@ -12425,7 +12491,7 @@
         <p:spPr>
           <a:xfrm>
             <a:off x="15254127" y="9185340"/>
-            <a:ext cx="4400053" cy="5386043"/>
+            <a:ext cx="4400053" cy="4887445"/>
           </a:xfrm>
           <a:prstGeom prst="rect">
             <a:avLst/>
@@ -12655,26 +12721,36 @@
               <a:buChar char="•"/>
             </a:pPr>
             <a:r>
+              <a:rPr lang="en-US" sz="1800" dirty="0" smtClean="0"/>
+              <a:t>Average </a:t>
+            </a:r>
+            <a:r>
               <a:rPr lang="en-US" sz="1800" dirty="0"/>
-              <a:t>1600 samples with 65-70% for training, 15% for validation and rest for test</a:t>
+              <a:t>result </a:t>
             </a:r>
             <a:r>
               <a:rPr lang="en-US" sz="1800" dirty="0" smtClean="0"/>
-              <a:t>.</a:t>
-            </a:r>
-            <a:endParaRPr lang="en-US" sz="1800" dirty="0"/>
-          </a:p>
-          <a:p>
-            <a:pPr marL="285750" indent="-285750">
-              <a:lnSpc>
-                <a:spcPct val="80000"/>
-              </a:lnSpc>
-              <a:buFont typeface="Arial"/>
-              <a:buChar char="•"/>
-            </a:pPr>
+              <a:t>on 3800 samples: </a:t>
+            </a:r>
             <a:r>
               <a:rPr lang="en-US" sz="1800" dirty="0"/>
-              <a:t>Average result : 84% on the testing set, 95% on the training set and 86% on the validation</a:t>
+              <a:t>84% on the testing set, </a:t>
+            </a:r>
+            <a:r>
+              <a:rPr lang="en-US" sz="1800" dirty="0" smtClean="0"/>
+              <a:t>91% </a:t>
+            </a:r>
+            <a:r>
+              <a:rPr lang="en-US" sz="1800" dirty="0"/>
+              <a:t>on the training set and </a:t>
+            </a:r>
+            <a:r>
+              <a:rPr lang="en-US" sz="1800" dirty="0" smtClean="0"/>
+              <a:t>83% </a:t>
+            </a:r>
+            <a:r>
+              <a:rPr lang="en-US" sz="1800" dirty="0"/>
+              <a:t>on the validation</a:t>
             </a:r>
             <a:r>
               <a:rPr lang="en-US" sz="1800" dirty="0" smtClean="0"/>
@@ -12839,7 +12915,7 @@
           <p:nvPr/>
         </p:nvPicPr>
         <p:blipFill>
-          <a:blip r:embed="rId13">
+          <a:blip r:embed="rId11">
             <a:extLst>
               <a:ext uri="{28A0092B-C50C-407E-A947-70E740481C1C}">
                 <a14:useLocalDpi xmlns:a14="http://schemas.microsoft.com/office/drawing/2010/main" val="0"/>
@@ -12869,7 +12945,7 @@
           <p:nvPr/>
         </p:nvPicPr>
         <p:blipFill>
-          <a:blip r:embed="rId14">
+          <a:blip r:embed="rId12">
             <a:extLst>
               <a:ext uri="{28A0092B-C50C-407E-A947-70E740481C1C}">
                 <a14:useLocalDpi xmlns:a14="http://schemas.microsoft.com/office/drawing/2010/main" val="0"/>
@@ -12899,7 +12975,7 @@
           <p:nvPr/>
         </p:nvPicPr>
         <p:blipFill>
-          <a:blip r:embed="rId15">
+          <a:blip r:embed="rId13">
             <a:extLst>
               <a:ext uri="{28A0092B-C50C-407E-A947-70E740481C1C}">
                 <a14:useLocalDpi xmlns:a14="http://schemas.microsoft.com/office/drawing/2010/main" val="0"/>
@@ -12929,7 +13005,7 @@
           <p:nvPr/>
         </p:nvPicPr>
         <p:blipFill>
-          <a:blip r:embed="rId16">
+          <a:blip r:embed="rId14">
             <a:extLst>
               <a:ext uri="{28A0092B-C50C-407E-A947-70E740481C1C}">
                 <a14:useLocalDpi xmlns:a14="http://schemas.microsoft.com/office/drawing/2010/main" val="0"/>
@@ -13014,7 +13090,7 @@
           <p:nvPr/>
         </p:nvPicPr>
         <p:blipFill>
-          <a:blip r:embed="rId17">
+          <a:blip r:embed="rId15">
             <a:extLst>
               <a:ext uri="{28A0092B-C50C-407E-A947-70E740481C1C}">
                 <a14:useLocalDpi xmlns:a14="http://schemas.microsoft.com/office/drawing/2010/main" val="0"/>
@@ -13044,7 +13120,7 @@
           <p:nvPr/>
         </p:nvPicPr>
         <p:blipFill>
-          <a:blip r:embed="rId18">
+          <a:blip r:embed="rId16">
             <a:extLst>
               <a:ext uri="{28A0092B-C50C-407E-A947-70E740481C1C}">
                 <a14:useLocalDpi xmlns:a14="http://schemas.microsoft.com/office/drawing/2010/main" val="0"/>
@@ -13074,7 +13150,7 @@
           <p:nvPr/>
         </p:nvPicPr>
         <p:blipFill>
-          <a:blip r:embed="rId19">
+          <a:blip r:embed="rId17">
             <a:extLst>
               <a:ext uri="{28A0092B-C50C-407E-A947-70E740481C1C}">
                 <a14:useLocalDpi xmlns:a14="http://schemas.microsoft.com/office/drawing/2010/main" val="0"/>
@@ -13271,7 +13347,7 @@
           <p:nvPr/>
         </p:nvPicPr>
         <p:blipFill>
-          <a:blip r:embed="rId20">
+          <a:blip r:embed="rId18">
             <a:extLst>
               <a:ext uri="{28A0092B-C50C-407E-A947-70E740481C1C}">
                 <a14:useLocalDpi xmlns:a14="http://schemas.microsoft.com/office/drawing/2010/main" val="0"/>
@@ -13427,7 +13503,7 @@
           <p:nvPr/>
         </p:nvPicPr>
         <p:blipFill>
-          <a:blip r:embed="rId21">
+          <a:blip r:embed="rId19">
             <a:extLst>
               <a:ext uri="{28A0092B-C50C-407E-A947-70E740481C1C}">
                 <a14:useLocalDpi xmlns:a14="http://schemas.microsoft.com/office/drawing/2010/main" val="0"/>
@@ -13457,7 +13533,7 @@
           <p:nvPr/>
         </p:nvPicPr>
         <p:blipFill>
-          <a:blip r:embed="rId22">
+          <a:blip r:embed="rId20">
             <a:extLst>
               <a:ext uri="{28A0092B-C50C-407E-A947-70E740481C1C}">
                 <a14:useLocalDpi xmlns:a14="http://schemas.microsoft.com/office/drawing/2010/main" val="0"/>
@@ -13516,7 +13592,7 @@
           <p:nvPr/>
         </p:nvPicPr>
         <p:blipFill>
-          <a:blip r:embed="rId23">
+          <a:blip r:embed="rId21">
             <a:extLst>
               <a:ext uri="{28A0092B-C50C-407E-A947-70E740481C1C}">
                 <a14:useLocalDpi xmlns:a14="http://schemas.microsoft.com/office/drawing/2010/main" val="0"/>
@@ -13546,7 +13622,7 @@
           <p:nvPr/>
         </p:nvPicPr>
         <p:blipFill>
-          <a:blip r:embed="rId24">
+          <a:blip r:embed="rId22">
             <a:extLst>
               <a:ext uri="{28A0092B-C50C-407E-A947-70E740481C1C}">
                 <a14:useLocalDpi xmlns:a14="http://schemas.microsoft.com/office/drawing/2010/main" val="0"/>
@@ -13576,7 +13652,7 @@
           <p:nvPr/>
         </p:nvPicPr>
         <p:blipFill>
-          <a:blip r:embed="rId25">
+          <a:blip r:embed="rId23">
             <a:extLst>
               <a:ext uri="{28A0092B-C50C-407E-A947-70E740481C1C}">
                 <a14:useLocalDpi xmlns:a14="http://schemas.microsoft.com/office/drawing/2010/main" val="0"/>
@@ -13606,7 +13682,7 @@
           <p:nvPr/>
         </p:nvPicPr>
         <p:blipFill>
-          <a:blip r:embed="rId26">
+          <a:blip r:embed="rId24">
             <a:extLst>
               <a:ext uri="{28A0092B-C50C-407E-A947-70E740481C1C}">
                 <a14:useLocalDpi xmlns:a14="http://schemas.microsoft.com/office/drawing/2010/main" val="0"/>
@@ -13636,7 +13712,7 @@
           <p:nvPr/>
         </p:nvPicPr>
         <p:blipFill>
-          <a:blip r:embed="rId27">
+          <a:blip r:embed="rId25">
             <a:extLst>
               <a:ext uri="{28A0092B-C50C-407E-A947-70E740481C1C}">
                 <a14:useLocalDpi xmlns:a14="http://schemas.microsoft.com/office/drawing/2010/main" val="0"/>
@@ -13727,6 +13803,66 @@
           </a:p>
         </p:txBody>
       </p:sp>
+      <p:pic>
+        <p:nvPicPr>
+          <p:cNvPr id="18" name="Picture 17"/>
+          <p:cNvPicPr>
+            <a:picLocks noChangeAspect="1"/>
+          </p:cNvPicPr>
+          <p:nvPr/>
+        </p:nvPicPr>
+        <p:blipFill>
+          <a:blip r:embed="rId26">
+            <a:extLst>
+              <a:ext uri="{28A0092B-C50C-407E-A947-70E740481C1C}">
+                <a14:useLocalDpi xmlns:a14="http://schemas.microsoft.com/office/drawing/2010/main" val="0"/>
+              </a:ext>
+            </a:extLst>
+          </a:blip>
+          <a:stretch>
+            <a:fillRect/>
+          </a:stretch>
+        </p:blipFill>
+        <p:spPr>
+          <a:xfrm>
+            <a:off x="15396525" y="13620378"/>
+            <a:ext cx="4234104" cy="2316865"/>
+          </a:xfrm>
+          <a:prstGeom prst="rect">
+            <a:avLst/>
+          </a:prstGeom>
+        </p:spPr>
+      </p:pic>
+      <p:pic>
+        <p:nvPicPr>
+          <p:cNvPr id="21" name="Picture 20"/>
+          <p:cNvPicPr>
+            <a:picLocks noChangeAspect="1"/>
+          </p:cNvPicPr>
+          <p:nvPr/>
+        </p:nvPicPr>
+        <p:blipFill>
+          <a:blip r:embed="rId27">
+            <a:extLst>
+              <a:ext uri="{28A0092B-C50C-407E-A947-70E740481C1C}">
+                <a14:useLocalDpi xmlns:a14="http://schemas.microsoft.com/office/drawing/2010/main" val="0"/>
+              </a:ext>
+            </a:extLst>
+          </a:blip>
+          <a:stretch>
+            <a:fillRect/>
+          </a:stretch>
+        </p:blipFill>
+        <p:spPr>
+          <a:xfrm>
+            <a:off x="15396526" y="15937243"/>
+            <a:ext cx="4234104" cy="2041208"/>
+          </a:xfrm>
+          <a:prstGeom prst="rect">
+            <a:avLst/>
+          </a:prstGeom>
+        </p:spPr>
+      </p:pic>
     </p:spTree>
     <p:extLst>
       <p:ext uri="{BB962C8B-B14F-4D97-AF65-F5344CB8AC3E}">
@@ -13737,18 +13873,18 @@
   <p:clrMapOvr>
     <a:masterClrMapping/>
   </p:clrMapOvr>
-  <mc:AlternateContent xmlns:mc="http://schemas.openxmlformats.org/markup-compatibility/2006" xmlns:p14="http://schemas.microsoft.com/office/powerpoint/2010/main">
-    <mc:Choice Requires="p14">
+  <mc:AlternateContent xmlns:mc="http://schemas.openxmlformats.org/markup-compatibility/2006">
+    <mc:Choice xmlns:p14="http://schemas.microsoft.com/office/powerpoint/2010/main" Requires="p14">
       <p:transition spd="slow" p14:dur="2000"/>
     </mc:Choice>
-    <mc:Fallback xmlns="">
-      <p:transition xmlns:p14="http://schemas.microsoft.com/office/powerpoint/2010/main" spd="slow"/>
+    <mc:Fallback>
+      <p:transition spd="slow"/>
     </mc:Fallback>
   </mc:AlternateContent>
   <p:timing>
     <p:tnLst>
       <p:par>
-        <p:cTn xmlns:p14="http://schemas.microsoft.com/office/powerpoint/2010/main" id="1" dur="indefinite" restart="never" nodeType="tmRoot"/>
+        <p:cTn id="1" dur="indefinite" restart="never" nodeType="tmRoot"/>
       </p:par>
     </p:tnLst>
   </p:timing>

</xml_diff>